<commit_message>
Primo tutorato completo con esempi
</commit_message>
<xml_diff>
--- a/UniPD/P2 - Semestre 1/25-10/Tutorato 1.pptx
+++ b/UniPD/P2 - Semestre 1/25-10/Tutorato 1.pptx
@@ -31,18 +31,18 @@
     <p:sldId id="296" r:id="rId22"/>
     <p:sldId id="276" r:id="rId23"/>
     <p:sldId id="285" r:id="rId24"/>
-    <p:sldId id="278" r:id="rId25"/>
-    <p:sldId id="290" r:id="rId26"/>
-    <p:sldId id="293" r:id="rId27"/>
-    <p:sldId id="299" r:id="rId28"/>
-    <p:sldId id="301" r:id="rId29"/>
-    <p:sldId id="267" r:id="rId30"/>
-    <p:sldId id="275" r:id="rId31"/>
-    <p:sldId id="269" r:id="rId32"/>
-    <p:sldId id="273" r:id="rId33"/>
-    <p:sldId id="291" r:id="rId34"/>
-    <p:sldId id="294" r:id="rId35"/>
-    <p:sldId id="292" r:id="rId36"/>
+    <p:sldId id="303" r:id="rId25"/>
+    <p:sldId id="278" r:id="rId26"/>
+    <p:sldId id="290" r:id="rId27"/>
+    <p:sldId id="293" r:id="rId28"/>
+    <p:sldId id="299" r:id="rId29"/>
+    <p:sldId id="301" r:id="rId30"/>
+    <p:sldId id="267" r:id="rId31"/>
+    <p:sldId id="275" r:id="rId32"/>
+    <p:sldId id="269" r:id="rId33"/>
+    <p:sldId id="273" r:id="rId34"/>
+    <p:sldId id="291" r:id="rId35"/>
+    <p:sldId id="294" r:id="rId36"/>
     <p:sldId id="302" r:id="rId37"/>
   </p:sldIdLst>
   <p:sldSz cx="9144000" cy="6858000" type="screen4x3"/>
@@ -232,7 +232,7 @@
           <a:p>
             <a:fld id="{0E4AAC6D-2322-45B9-8ECA-34DF280B0776}" type="datetimeFigureOut">
               <a:rPr lang="en-US" smtClean="0"/>
-              <a:t>10/24/2023</a:t>
+              <a:t>10/25/2023</a:t>
             </a:fld>
             <a:endParaRPr lang="en-US"/>
           </a:p>
@@ -4811,13 +4811,13 @@
         <p:spPr/>
         <p:txBody>
           <a:bodyPr>
-            <a:normAutofit fontScale="90000"/>
+            <a:noAutofit/>
           </a:bodyPr>
           <a:lstStyle/>
           <a:p>
             <a:r>
-              <a:rPr lang="it-IT" dirty="0"/>
-              <a:t>Ottimizzazione del compilatore</a:t>
+              <a:rPr lang="it-IT" sz="3600" dirty="0"/>
+              <a:t>Differenza tra copia e assegnazione</a:t>
             </a:r>
           </a:p>
         </p:txBody>
@@ -4855,92 +4855,12 @@
           </a:p>
         </p:txBody>
       </p:sp>
-      <p:sp>
-        <p:nvSpPr>
-          <p:cNvPr id="3" name="CasellaDiTesto 2">
-            <a:extLst>
-              <a:ext uri="{FF2B5EF4-FFF2-40B4-BE49-F238E27FC236}">
-                <a16:creationId xmlns:a16="http://schemas.microsoft.com/office/drawing/2014/main" id="{6BF61A20-403F-2E80-D5FA-072071836244}"/>
-              </a:ext>
-            </a:extLst>
-          </p:cNvPr>
-          <p:cNvSpPr txBox="1"/>
-          <p:nvPr/>
-        </p:nvSpPr>
-        <p:spPr>
-          <a:xfrm>
-            <a:off x="2456688" y="1402346"/>
-            <a:ext cx="3913632" cy="646331"/>
-          </a:xfrm>
-          <a:prstGeom prst="rect">
-            <a:avLst/>
-          </a:prstGeom>
-          <a:noFill/>
-        </p:spPr>
-        <p:txBody>
-          <a:bodyPr wrap="square" rtlCol="0">
-            <a:spAutoFit/>
-          </a:bodyPr>
-          <a:lstStyle/>
-          <a:p>
-            <a:r>
-              <a:rPr lang="it-IT" i="1" dirty="0">
-                <a:latin typeface="Consolas" panose="020B0609020204030204" pitchFamily="49" charset="0"/>
-              </a:rPr>
-              <a:t>g++ -fno-elide-constructors</a:t>
-            </a:r>
-            <a:endParaRPr lang="it-IT" i="1" dirty="0"/>
-          </a:p>
-          <a:p>
-            <a:pPr marL="285750" indent="-285750">
-              <a:buFont typeface="Arial" panose="020B0604020202020204" pitchFamily="34" charset="0"/>
-              <a:buChar char="•"/>
-            </a:pPr>
-            <a:endParaRPr lang="it-IT" dirty="0"/>
-          </a:p>
-        </p:txBody>
-      </p:sp>
-      <p:sp>
-        <p:nvSpPr>
-          <p:cNvPr id="6" name="CasellaDiTesto 5">
-            <a:extLst>
-              <a:ext uri="{FF2B5EF4-FFF2-40B4-BE49-F238E27FC236}">
-                <a16:creationId xmlns:a16="http://schemas.microsoft.com/office/drawing/2014/main" id="{F5B84F5E-DD35-27D6-D2B3-0E25058CC1BC}"/>
-              </a:ext>
-            </a:extLst>
-          </p:cNvPr>
-          <p:cNvSpPr txBox="1"/>
-          <p:nvPr/>
-        </p:nvSpPr>
-        <p:spPr>
-          <a:xfrm>
-            <a:off x="761999" y="1930947"/>
-            <a:ext cx="7620000" cy="923330"/>
-          </a:xfrm>
-          <a:prstGeom prst="rect">
-            <a:avLst/>
-          </a:prstGeom>
-          <a:noFill/>
-        </p:spPr>
-        <p:txBody>
-          <a:bodyPr wrap="square" rtlCol="0">
-            <a:spAutoFit/>
-          </a:bodyPr>
-          <a:lstStyle/>
-          <a:p>
-            <a:r>
-              <a:rPr lang="it-IT" dirty="0"/>
-              <a:t>Evita la creazione di un oggetto temporaneo inutile per costruire oggetti dello stesso tipo; a fini didattici spesso non consideriamo questa (e lo usiamo nelle stampe per vedere «tutto» quello che avviene in memoria)</a:t>
-            </a:r>
-          </a:p>
-        </p:txBody>
-      </p:sp>
       <p:pic>
         <p:nvPicPr>
-          <p:cNvPr id="7" name="Immagine 6">
-            <a:extLst>
-              <a:ext uri="{FF2B5EF4-FFF2-40B4-BE49-F238E27FC236}">
-                <a16:creationId xmlns:a16="http://schemas.microsoft.com/office/drawing/2014/main" id="{7342C12D-26EE-481B-9907-05DE9AC973EF}"/>
+          <p:cNvPr id="5" name="Immagine 4">
+            <a:extLst>
+              <a:ext uri="{FF2B5EF4-FFF2-40B4-BE49-F238E27FC236}">
+                <a16:creationId xmlns:a16="http://schemas.microsoft.com/office/drawing/2014/main" id="{23BE7C22-258E-3E50-B895-6D4EE51FF4CF}"/>
               </a:ext>
             </a:extLst>
           </p:cNvPr>
@@ -4957,18 +4877,83 @@
         </p:blipFill>
         <p:spPr>
           <a:xfrm>
-            <a:off x="1838539" y="3116410"/>
-            <a:ext cx="5466921" cy="2772325"/>
+            <a:off x="1190550" y="2708369"/>
+            <a:ext cx="6762900" cy="3534974"/>
           </a:xfrm>
           <a:prstGeom prst="rect">
             <a:avLst/>
           </a:prstGeom>
         </p:spPr>
       </p:pic>
+      <p:sp>
+        <p:nvSpPr>
+          <p:cNvPr id="7" name="CasellaDiTesto 6">
+            <a:extLst>
+              <a:ext uri="{FF2B5EF4-FFF2-40B4-BE49-F238E27FC236}">
+                <a16:creationId xmlns:a16="http://schemas.microsoft.com/office/drawing/2014/main" id="{8F516144-0667-4B43-BC72-3725DE1849BB}"/>
+              </a:ext>
+            </a:extLst>
+          </p:cNvPr>
+          <p:cNvSpPr txBox="1"/>
+          <p:nvPr/>
+        </p:nvSpPr>
+        <p:spPr>
+          <a:xfrm>
+            <a:off x="618225" y="1177369"/>
+            <a:ext cx="7769737" cy="1477328"/>
+          </a:xfrm>
+          <a:prstGeom prst="rect">
+            <a:avLst/>
+          </a:prstGeom>
+          <a:noFill/>
+        </p:spPr>
+        <p:txBody>
+          <a:bodyPr wrap="square" rtlCol="0">
+            <a:spAutoFit/>
+          </a:bodyPr>
+          <a:lstStyle/>
+          <a:p>
+            <a:pPr marL="285750" indent="-285750">
+              <a:buFont typeface="Arial" panose="020B0604020202020204" pitchFamily="34" charset="0"/>
+              <a:buChar char="•"/>
+            </a:pPr>
+            <a:r>
+              <a:rPr lang="it-IT" dirty="0"/>
+              <a:t>Costruttore di copia: (copia) uno spazio di memoria della stessa classe per un oggetto </a:t>
+            </a:r>
+            <a:r>
+              <a:rPr lang="it-IT" b="1" dirty="0"/>
+              <a:t>che non esiste già</a:t>
+            </a:r>
+            <a:endParaRPr lang="it-IT" dirty="0"/>
+          </a:p>
+          <a:p>
+            <a:endParaRPr lang="it-IT" dirty="0"/>
+          </a:p>
+          <a:p>
+            <a:pPr marL="285750" indent="-285750">
+              <a:buFont typeface="Arial" panose="020B0604020202020204" pitchFamily="34" charset="0"/>
+              <a:buChar char="•"/>
+            </a:pPr>
+            <a:r>
+              <a:rPr lang="it-IT" dirty="0"/>
+              <a:t>Operatore di assegnazione: (assegna) uno spazio di memoria per due oggetti </a:t>
+            </a:r>
+            <a:r>
+              <a:rPr lang="it-IT" b="1" dirty="0"/>
+              <a:t>già esistenti</a:t>
+            </a:r>
+            <a:r>
+              <a:rPr lang="it-IT" dirty="0"/>
+              <a:t> della stessa classe</a:t>
+            </a:r>
+          </a:p>
+        </p:txBody>
+      </p:sp>
     </p:spTree>
     <p:extLst>
       <p:ext uri="{BB962C8B-B14F-4D97-AF65-F5344CB8AC3E}">
-        <p14:creationId xmlns:p14="http://schemas.microsoft.com/office/powerpoint/2010/main" val="2319117001"/>
+        <p14:creationId xmlns:p14="http://schemas.microsoft.com/office/powerpoint/2010/main" val="3119471848"/>
       </p:ext>
     </p:extLst>
   </p:cSld>
@@ -5000,7 +4985,7 @@
           <p:cNvPr id="2" name="Titolo 1">
             <a:extLst>
               <a:ext uri="{FF2B5EF4-FFF2-40B4-BE49-F238E27FC236}">
-                <a16:creationId xmlns:a16="http://schemas.microsoft.com/office/drawing/2014/main" id="{7E094D2C-2C58-27DB-8836-62C5F689C9C6}"/>
+                <a16:creationId xmlns:a16="http://schemas.microsoft.com/office/drawing/2014/main" id="{A1C33B46-A1F8-111B-8108-D696C1BBCC68}"/>
               </a:ext>
             </a:extLst>
           </p:cNvPr>
@@ -5013,12 +4998,14 @@
         </p:nvSpPr>
         <p:spPr/>
         <p:txBody>
-          <a:bodyPr/>
-          <a:lstStyle/>
-          <a:p>
-            <a:r>
-              <a:rPr lang="it-IT" dirty="0"/>
-              <a:t>Esempio 2: Cosa stampa (3)</a:t>
+          <a:bodyPr>
+            <a:normAutofit fontScale="90000"/>
+          </a:bodyPr>
+          <a:lstStyle/>
+          <a:p>
+            <a:r>
+              <a:rPr lang="it-IT" dirty="0"/>
+              <a:t>Ottimizzazione del compilatore</a:t>
             </a:r>
           </a:p>
         </p:txBody>
@@ -5028,7 +5015,7 @@
           <p:cNvPr id="4" name="Segnaposto numero diapositiva 3">
             <a:extLst>
               <a:ext uri="{FF2B5EF4-FFF2-40B4-BE49-F238E27FC236}">
-                <a16:creationId xmlns:a16="http://schemas.microsoft.com/office/drawing/2014/main" id="{8FC0F31B-BCEA-FE98-0DBD-53D618ED76C0}"/>
+                <a16:creationId xmlns:a16="http://schemas.microsoft.com/office/drawing/2014/main" id="{30F37182-85E1-1CBA-A05A-CCEC4E40C29C}"/>
               </a:ext>
             </a:extLst>
           </p:cNvPr>
@@ -5056,12 +5043,92 @@
           </a:p>
         </p:txBody>
       </p:sp>
+      <p:sp>
+        <p:nvSpPr>
+          <p:cNvPr id="3" name="CasellaDiTesto 2">
+            <a:extLst>
+              <a:ext uri="{FF2B5EF4-FFF2-40B4-BE49-F238E27FC236}">
+                <a16:creationId xmlns:a16="http://schemas.microsoft.com/office/drawing/2014/main" id="{6BF61A20-403F-2E80-D5FA-072071836244}"/>
+              </a:ext>
+            </a:extLst>
+          </p:cNvPr>
+          <p:cNvSpPr txBox="1"/>
+          <p:nvPr/>
+        </p:nvSpPr>
+        <p:spPr>
+          <a:xfrm>
+            <a:off x="2456688" y="1402346"/>
+            <a:ext cx="3913632" cy="646331"/>
+          </a:xfrm>
+          <a:prstGeom prst="rect">
+            <a:avLst/>
+          </a:prstGeom>
+          <a:noFill/>
+        </p:spPr>
+        <p:txBody>
+          <a:bodyPr wrap="square" rtlCol="0">
+            <a:spAutoFit/>
+          </a:bodyPr>
+          <a:lstStyle/>
+          <a:p>
+            <a:r>
+              <a:rPr lang="it-IT" i="1" dirty="0">
+                <a:latin typeface="Consolas" panose="020B0609020204030204" pitchFamily="49" charset="0"/>
+              </a:rPr>
+              <a:t>g++ -fno-elide-constructors</a:t>
+            </a:r>
+            <a:endParaRPr lang="it-IT" i="1" dirty="0"/>
+          </a:p>
+          <a:p>
+            <a:pPr marL="285750" indent="-285750">
+              <a:buFont typeface="Arial" panose="020B0604020202020204" pitchFamily="34" charset="0"/>
+              <a:buChar char="•"/>
+            </a:pPr>
+            <a:endParaRPr lang="it-IT" dirty="0"/>
+          </a:p>
+        </p:txBody>
+      </p:sp>
+      <p:sp>
+        <p:nvSpPr>
+          <p:cNvPr id="6" name="CasellaDiTesto 5">
+            <a:extLst>
+              <a:ext uri="{FF2B5EF4-FFF2-40B4-BE49-F238E27FC236}">
+                <a16:creationId xmlns:a16="http://schemas.microsoft.com/office/drawing/2014/main" id="{F5B84F5E-DD35-27D6-D2B3-0E25058CC1BC}"/>
+              </a:ext>
+            </a:extLst>
+          </p:cNvPr>
+          <p:cNvSpPr txBox="1"/>
+          <p:nvPr/>
+        </p:nvSpPr>
+        <p:spPr>
+          <a:xfrm>
+            <a:off x="761999" y="1930947"/>
+            <a:ext cx="7620000" cy="923330"/>
+          </a:xfrm>
+          <a:prstGeom prst="rect">
+            <a:avLst/>
+          </a:prstGeom>
+          <a:noFill/>
+        </p:spPr>
+        <p:txBody>
+          <a:bodyPr wrap="square" rtlCol="0">
+            <a:spAutoFit/>
+          </a:bodyPr>
+          <a:lstStyle/>
+          <a:p>
+            <a:r>
+              <a:rPr lang="it-IT" dirty="0"/>
+              <a:t>Evita la creazione di un oggetto temporaneo inutile per costruire oggetti dello stesso tipo; a fini didattici spesso non consideriamo questa (e lo usiamo nelle stampe per vedere «tutto» quello che avviene in memoria)</a:t>
+            </a:r>
+          </a:p>
+        </p:txBody>
+      </p:sp>
       <p:pic>
         <p:nvPicPr>
-          <p:cNvPr id="6" name="Immagine 5">
-            <a:extLst>
-              <a:ext uri="{FF2B5EF4-FFF2-40B4-BE49-F238E27FC236}">
-                <a16:creationId xmlns:a16="http://schemas.microsoft.com/office/drawing/2014/main" id="{64FD58DB-5C4B-44EC-7A30-4B0DCEBC10B9}"/>
+          <p:cNvPr id="7" name="Immagine 6">
+            <a:extLst>
+              <a:ext uri="{FF2B5EF4-FFF2-40B4-BE49-F238E27FC236}">
+                <a16:creationId xmlns:a16="http://schemas.microsoft.com/office/drawing/2014/main" id="{7342C12D-26EE-481B-9907-05DE9AC973EF}"/>
               </a:ext>
             </a:extLst>
           </p:cNvPr>
@@ -5078,8 +5145,8 @@
         </p:blipFill>
         <p:spPr>
           <a:xfrm>
-            <a:off x="2390523" y="1850006"/>
-            <a:ext cx="4614078" cy="3567492"/>
+            <a:off x="1838539" y="3116410"/>
+            <a:ext cx="5466921" cy="2772325"/>
           </a:xfrm>
           <a:prstGeom prst="rect">
             <a:avLst/>
@@ -5089,7 +5156,7 @@
     </p:spTree>
     <p:extLst>
       <p:ext uri="{BB962C8B-B14F-4D97-AF65-F5344CB8AC3E}">
-        <p14:creationId xmlns:p14="http://schemas.microsoft.com/office/powerpoint/2010/main" val="2514840377"/>
+        <p14:creationId xmlns:p14="http://schemas.microsoft.com/office/powerpoint/2010/main" val="2319117001"/>
       </p:ext>
     </p:extLst>
   </p:cSld>
@@ -5139,7 +5206,7 @@
           <a:p>
             <a:r>
               <a:rPr lang="it-IT" dirty="0"/>
-              <a:t>Esempio 2: Soluzione</a:t>
+              <a:t>Esempio 2: Cosa stampa (3)</a:t>
             </a:r>
           </a:p>
         </p:txBody>
@@ -5182,7 +5249,7 @@
           <p:cNvPr id="6" name="Immagine 5">
             <a:extLst>
               <a:ext uri="{FF2B5EF4-FFF2-40B4-BE49-F238E27FC236}">
-                <a16:creationId xmlns:a16="http://schemas.microsoft.com/office/drawing/2014/main" id="{CB36E31E-FF45-45BD-D4D9-31A3AFBD1E62}"/>
+                <a16:creationId xmlns:a16="http://schemas.microsoft.com/office/drawing/2014/main" id="{64FD58DB-5C4B-44EC-7A30-4B0DCEBC10B9}"/>
               </a:ext>
             </a:extLst>
           </p:cNvPr>
@@ -5199,8 +5266,8 @@
         </p:blipFill>
         <p:spPr>
           <a:xfrm>
-            <a:off x="1066496" y="1468168"/>
-            <a:ext cx="7011008" cy="4404742"/>
+            <a:off x="2390523" y="1850006"/>
+            <a:ext cx="4614078" cy="3567492"/>
           </a:xfrm>
           <a:prstGeom prst="rect">
             <a:avLst/>
@@ -5210,7 +5277,7 @@
     </p:spTree>
     <p:extLst>
       <p:ext uri="{BB962C8B-B14F-4D97-AF65-F5344CB8AC3E}">
-        <p14:creationId xmlns:p14="http://schemas.microsoft.com/office/powerpoint/2010/main" val="3390164786"/>
+        <p14:creationId xmlns:p14="http://schemas.microsoft.com/office/powerpoint/2010/main" val="2514840377"/>
       </p:ext>
     </p:extLst>
   </p:cSld>
@@ -5260,7 +5327,7 @@
           <a:p>
             <a:r>
               <a:rPr lang="it-IT" dirty="0"/>
-              <a:t>Esercizio 3: Cosa stampa (4)</a:t>
+              <a:t>Esempio 2: Soluzione</a:t>
             </a:r>
           </a:p>
         </p:txBody>
@@ -5303,7 +5370,7 @@
           <p:cNvPr id="6" name="Immagine 5">
             <a:extLst>
               <a:ext uri="{FF2B5EF4-FFF2-40B4-BE49-F238E27FC236}">
-                <a16:creationId xmlns:a16="http://schemas.microsoft.com/office/drawing/2014/main" id="{9F236BD9-3F80-83CA-ECA2-6C8BCAC7C9A2}"/>
+                <a16:creationId xmlns:a16="http://schemas.microsoft.com/office/drawing/2014/main" id="{CB36E31E-FF45-45BD-D4D9-31A3AFBD1E62}"/>
               </a:ext>
             </a:extLst>
           </p:cNvPr>
@@ -5320,38 +5387,8 @@
         </p:blipFill>
         <p:spPr>
           <a:xfrm>
-            <a:off x="501113" y="1467523"/>
-            <a:ext cx="4070887" cy="3922954"/>
-          </a:xfrm>
-          <a:prstGeom prst="rect">
-            <a:avLst/>
-          </a:prstGeom>
-        </p:spPr>
-      </p:pic>
-      <p:pic>
-        <p:nvPicPr>
-          <p:cNvPr id="8" name="Immagine 7">
-            <a:extLst>
-              <a:ext uri="{FF2B5EF4-FFF2-40B4-BE49-F238E27FC236}">
-                <a16:creationId xmlns:a16="http://schemas.microsoft.com/office/drawing/2014/main" id="{D322EAB7-DFCC-C245-61CE-6206296C2C18}"/>
-              </a:ext>
-            </a:extLst>
-          </p:cNvPr>
-          <p:cNvPicPr>
-            <a:picLocks noChangeAspect="1"/>
-          </p:cNvPicPr>
-          <p:nvPr/>
-        </p:nvPicPr>
-        <p:blipFill>
-          <a:blip r:embed="rId3"/>
-          <a:stretch>
-            <a:fillRect/>
-          </a:stretch>
-        </p:blipFill>
-        <p:spPr>
-          <a:xfrm>
-            <a:off x="5171103" y="2111479"/>
-            <a:ext cx="2903012" cy="2635042"/>
+            <a:off x="1066496" y="1468168"/>
+            <a:ext cx="7011008" cy="4404742"/>
           </a:xfrm>
           <a:prstGeom prst="rect">
             <a:avLst/>
@@ -5361,7 +5398,7 @@
     </p:spTree>
     <p:extLst>
       <p:ext uri="{BB962C8B-B14F-4D97-AF65-F5344CB8AC3E}">
-        <p14:creationId xmlns:p14="http://schemas.microsoft.com/office/powerpoint/2010/main" val="1053476045"/>
+        <p14:creationId xmlns:p14="http://schemas.microsoft.com/office/powerpoint/2010/main" val="3390164786"/>
       </p:ext>
     </p:extLst>
   </p:cSld>
@@ -5411,7 +5448,7 @@
           <a:p>
             <a:r>
               <a:rPr lang="it-IT" dirty="0"/>
-              <a:t>Esercizio 3: Soluzione</a:t>
+              <a:t>Esercizio 3: Cosa stampa (4)</a:t>
             </a:r>
           </a:p>
         </p:txBody>
@@ -5451,10 +5488,10 @@
       </p:sp>
       <p:pic>
         <p:nvPicPr>
-          <p:cNvPr id="5" name="Immagine 4">
-            <a:extLst>
-              <a:ext uri="{FF2B5EF4-FFF2-40B4-BE49-F238E27FC236}">
-                <a16:creationId xmlns:a16="http://schemas.microsoft.com/office/drawing/2014/main" id="{D923B37D-0822-E59E-C6AD-E9503356351A}"/>
+          <p:cNvPr id="6" name="Immagine 5">
+            <a:extLst>
+              <a:ext uri="{FF2B5EF4-FFF2-40B4-BE49-F238E27FC236}">
+                <a16:creationId xmlns:a16="http://schemas.microsoft.com/office/drawing/2014/main" id="{9F236BD9-3F80-83CA-ECA2-6C8BCAC7C9A2}"/>
               </a:ext>
             </a:extLst>
           </p:cNvPr>
@@ -5471,8 +5508,38 @@
         </p:blipFill>
         <p:spPr>
           <a:xfrm>
-            <a:off x="2162273" y="1978906"/>
-            <a:ext cx="4687101" cy="2900188"/>
+            <a:off x="501113" y="1467523"/>
+            <a:ext cx="4070887" cy="3922954"/>
+          </a:xfrm>
+          <a:prstGeom prst="rect">
+            <a:avLst/>
+          </a:prstGeom>
+        </p:spPr>
+      </p:pic>
+      <p:pic>
+        <p:nvPicPr>
+          <p:cNvPr id="8" name="Immagine 7">
+            <a:extLst>
+              <a:ext uri="{FF2B5EF4-FFF2-40B4-BE49-F238E27FC236}">
+                <a16:creationId xmlns:a16="http://schemas.microsoft.com/office/drawing/2014/main" id="{D322EAB7-DFCC-C245-61CE-6206296C2C18}"/>
+              </a:ext>
+            </a:extLst>
+          </p:cNvPr>
+          <p:cNvPicPr>
+            <a:picLocks noChangeAspect="1"/>
+          </p:cNvPicPr>
+          <p:nvPr/>
+        </p:nvPicPr>
+        <p:blipFill>
+          <a:blip r:embed="rId3"/>
+          <a:stretch>
+            <a:fillRect/>
+          </a:stretch>
+        </p:blipFill>
+        <p:spPr>
+          <a:xfrm>
+            <a:off x="5171103" y="2111479"/>
+            <a:ext cx="2903012" cy="2635042"/>
           </a:xfrm>
           <a:prstGeom prst="rect">
             <a:avLst/>
@@ -5482,7 +5549,7 @@
     </p:spTree>
     <p:extLst>
       <p:ext uri="{BB962C8B-B14F-4D97-AF65-F5344CB8AC3E}">
-        <p14:creationId xmlns:p14="http://schemas.microsoft.com/office/powerpoint/2010/main" val="207736931"/>
+        <p14:creationId xmlns:p14="http://schemas.microsoft.com/office/powerpoint/2010/main" val="1053476045"/>
       </p:ext>
     </p:extLst>
   </p:cSld>
@@ -5514,7 +5581,7 @@
           <p:cNvPr id="2" name="Titolo 1">
             <a:extLst>
               <a:ext uri="{FF2B5EF4-FFF2-40B4-BE49-F238E27FC236}">
-                <a16:creationId xmlns:a16="http://schemas.microsoft.com/office/drawing/2014/main" id="{A1C33B46-A1F8-111B-8108-D696C1BBCC68}"/>
+                <a16:creationId xmlns:a16="http://schemas.microsoft.com/office/drawing/2014/main" id="{7E094D2C-2C58-27DB-8836-62C5F689C9C6}"/>
               </a:ext>
             </a:extLst>
           </p:cNvPr>
@@ -5532,7 +5599,7 @@
           <a:p>
             <a:r>
               <a:rPr lang="it-IT" dirty="0"/>
-              <a:t>Overloading degli operatori</a:t>
+              <a:t>Esercizio 3: Soluzione</a:t>
             </a:r>
           </a:p>
         </p:txBody>
@@ -5542,7 +5609,7 @@
           <p:cNvPr id="4" name="Segnaposto numero diapositiva 3">
             <a:extLst>
               <a:ext uri="{FF2B5EF4-FFF2-40B4-BE49-F238E27FC236}">
-                <a16:creationId xmlns:a16="http://schemas.microsoft.com/office/drawing/2014/main" id="{30F37182-85E1-1CBA-A05A-CCEC4E40C29C}"/>
+                <a16:creationId xmlns:a16="http://schemas.microsoft.com/office/drawing/2014/main" id="{8FC0F31B-BCEA-FE98-0DBD-53D618ED76C0}"/>
               </a:ext>
             </a:extLst>
           </p:cNvPr>
@@ -5570,177 +5637,12 @@
           </a:p>
         </p:txBody>
       </p:sp>
-      <p:sp>
-        <p:nvSpPr>
-          <p:cNvPr id="9" name="CasellaDiTesto 8">
-            <a:extLst>
-              <a:ext uri="{FF2B5EF4-FFF2-40B4-BE49-F238E27FC236}">
-                <a16:creationId xmlns:a16="http://schemas.microsoft.com/office/drawing/2014/main" id="{4B6313EF-3010-D4E4-5F5D-1FF5C2A34D0E}"/>
-              </a:ext>
-            </a:extLst>
-          </p:cNvPr>
-          <p:cNvSpPr txBox="1"/>
-          <p:nvPr/>
-        </p:nvSpPr>
-        <p:spPr>
-          <a:xfrm>
-            <a:off x="484246" y="1557431"/>
-            <a:ext cx="7769737" cy="4801314"/>
-          </a:xfrm>
-          <a:prstGeom prst="rect">
-            <a:avLst/>
-          </a:prstGeom>
-          <a:noFill/>
-        </p:spPr>
-        <p:txBody>
-          <a:bodyPr wrap="square" rtlCol="0">
-            <a:spAutoFit/>
-          </a:bodyPr>
-          <a:lstStyle/>
-          <a:p>
-            <a:pPr marL="285750" indent="-285750">
-              <a:buFont typeface="Arial" panose="020B0604020202020204" pitchFamily="34" charset="0"/>
-              <a:buChar char="•"/>
-            </a:pPr>
-            <a:r>
-              <a:rPr lang="it-IT" dirty="0"/>
-              <a:t>Ridefinizione di funzionalità per il contesto di una classe </a:t>
-            </a:r>
-          </a:p>
-          <a:p>
-            <a:pPr marL="742950" lvl="1" indent="-285750">
-              <a:buFont typeface="Arial" panose="020B0604020202020204" pitchFamily="34" charset="0"/>
-              <a:buChar char="•"/>
-            </a:pPr>
-            <a:r>
-              <a:rPr lang="it-IT" dirty="0"/>
-              <a:t>(e.g. somma di orari in </a:t>
-            </a:r>
-            <a:r>
-              <a:rPr lang="it-IT" dirty="0">
-                <a:latin typeface="Consolas" panose="020B0609020204030204" pitchFamily="49" charset="0"/>
-              </a:rPr>
-              <a:t>Orario</a:t>
-            </a:r>
-            <a:r>
-              <a:rPr lang="it-IT" dirty="0"/>
-              <a:t>)</a:t>
-            </a:r>
-          </a:p>
-          <a:p>
-            <a:pPr marL="285750" indent="-285750">
-              <a:buFont typeface="Arial" panose="020B0604020202020204" pitchFamily="34" charset="0"/>
-              <a:buChar char="•"/>
-            </a:pPr>
-            <a:endParaRPr lang="it-IT" dirty="0"/>
-          </a:p>
-          <a:p>
-            <a:pPr marL="285750" indent="-285750">
-              <a:buFont typeface="Arial" panose="020B0604020202020204" pitchFamily="34" charset="0"/>
-              <a:buChar char="•"/>
-            </a:pPr>
-            <a:r>
-              <a:rPr lang="it-IT" dirty="0"/>
-              <a:t>Tali funzionalità vengono definite mediante l’uso di operatori</a:t>
-            </a:r>
-          </a:p>
-          <a:p>
-            <a:pPr marL="285750" indent="-285750">
-              <a:buFont typeface="Arial" panose="020B0604020202020204" pitchFamily="34" charset="0"/>
-              <a:buChar char="•"/>
-            </a:pPr>
-            <a:endParaRPr lang="it-IT" dirty="0"/>
-          </a:p>
-          <a:p>
-            <a:pPr marL="285750" indent="-285750">
-              <a:buFont typeface="Arial" panose="020B0604020202020204" pitchFamily="34" charset="0"/>
-              <a:buChar char="•"/>
-            </a:pPr>
-            <a:endParaRPr lang="it-IT" dirty="0"/>
-          </a:p>
-          <a:p>
-            <a:pPr marL="285750" indent="-285750">
-              <a:buFont typeface="Arial" panose="020B0604020202020204" pitchFamily="34" charset="0"/>
-              <a:buChar char="•"/>
-            </a:pPr>
-            <a:endParaRPr lang="it-IT" dirty="0"/>
-          </a:p>
-          <a:p>
-            <a:pPr marL="285750" indent="-285750">
-              <a:buFont typeface="Arial" panose="020B0604020202020204" pitchFamily="34" charset="0"/>
-              <a:buChar char="•"/>
-            </a:pPr>
-            <a:endParaRPr lang="it-IT" dirty="0"/>
-          </a:p>
-          <a:p>
-            <a:pPr marL="285750" indent="-285750">
-              <a:buFont typeface="Arial" panose="020B0604020202020204" pitchFamily="34" charset="0"/>
-              <a:buChar char="•"/>
-            </a:pPr>
-            <a:r>
-              <a:rPr lang="it-IT" dirty="0"/>
-              <a:t>Caso importante:</a:t>
-            </a:r>
-          </a:p>
-          <a:p>
-            <a:pPr marL="742950" lvl="1" indent="-285750">
-              <a:buFont typeface="Arial" panose="020B0604020202020204" pitchFamily="34" charset="0"/>
-              <a:buChar char="•"/>
-            </a:pPr>
-            <a:r>
-              <a:rPr lang="it-IT" u="sng" dirty="0"/>
-              <a:t>Assegnazione standard</a:t>
-            </a:r>
-          </a:p>
-          <a:p>
-            <a:pPr lvl="1"/>
-            <a:endParaRPr lang="it-IT" dirty="0"/>
-          </a:p>
-          <a:p>
-            <a:pPr lvl="1"/>
-            <a:endParaRPr lang="it-IT" dirty="0"/>
-          </a:p>
-          <a:p>
-            <a:pPr lvl="1"/>
-            <a:endParaRPr lang="it-IT" dirty="0"/>
-          </a:p>
-          <a:p>
-            <a:pPr lvl="1"/>
-            <a:endParaRPr lang="it-IT" dirty="0"/>
-          </a:p>
-          <a:p>
-            <a:pPr marL="742950" lvl="1" indent="-285750">
-              <a:buFont typeface="Arial" panose="020B0604020202020204" pitchFamily="34" charset="0"/>
-              <a:buChar char="•"/>
-            </a:pPr>
-            <a:r>
-              <a:rPr lang="it-IT" dirty="0"/>
-              <a:t>Simile all’assegnazione standard, vi è il </a:t>
-            </a:r>
-            <a:r>
-              <a:rPr lang="it-IT" u="sng" dirty="0"/>
-              <a:t>costruttore di copia</a:t>
-            </a:r>
-          </a:p>
-          <a:p>
-            <a:pPr lvl="1"/>
-            <a:endParaRPr lang="it-IT" dirty="0"/>
-          </a:p>
-          <a:p>
-            <a:pPr marL="285750" indent="-285750">
-              <a:buFont typeface="Arial" panose="020B0604020202020204" pitchFamily="34" charset="0"/>
-              <a:buChar char="•"/>
-            </a:pPr>
-            <a:endParaRPr lang="it-IT" dirty="0"/>
-          </a:p>
-        </p:txBody>
-      </p:sp>
       <p:pic>
         <p:nvPicPr>
           <p:cNvPr id="5" name="Immagine 4">
             <a:extLst>
               <a:ext uri="{FF2B5EF4-FFF2-40B4-BE49-F238E27FC236}">
-                <a16:creationId xmlns:a16="http://schemas.microsoft.com/office/drawing/2014/main" id="{C62E3CCC-934F-C007-76CB-21E517C631BB}"/>
+                <a16:creationId xmlns:a16="http://schemas.microsoft.com/office/drawing/2014/main" id="{D923B37D-0822-E59E-C6AD-E9503356351A}"/>
               </a:ext>
             </a:extLst>
           </p:cNvPr>
@@ -5757,68 +5659,8 @@
         </p:blipFill>
         <p:spPr>
           <a:xfrm>
-            <a:off x="1521039" y="2752594"/>
-            <a:ext cx="6101922" cy="608095"/>
-          </a:xfrm>
-          <a:prstGeom prst="rect">
-            <a:avLst/>
-          </a:prstGeom>
-        </p:spPr>
-      </p:pic>
-      <p:pic>
-        <p:nvPicPr>
-          <p:cNvPr id="6" name="Immagine 5">
-            <a:extLst>
-              <a:ext uri="{FF2B5EF4-FFF2-40B4-BE49-F238E27FC236}">
-                <a16:creationId xmlns:a16="http://schemas.microsoft.com/office/drawing/2014/main" id="{922C048C-1D1C-6906-FC68-86C1DAEF2EEF}"/>
-              </a:ext>
-            </a:extLst>
-          </p:cNvPr>
-          <p:cNvPicPr>
-            <a:picLocks noChangeAspect="1"/>
-          </p:cNvPicPr>
-          <p:nvPr/>
-        </p:nvPicPr>
-        <p:blipFill>
-          <a:blip r:embed="rId3"/>
-          <a:stretch>
-            <a:fillRect/>
-          </a:stretch>
-        </p:blipFill>
-        <p:spPr>
-          <a:xfrm>
-            <a:off x="4517355" y="3637216"/>
-            <a:ext cx="2685674" cy="779050"/>
-          </a:xfrm>
-          <a:prstGeom prst="rect">
-            <a:avLst/>
-          </a:prstGeom>
-        </p:spPr>
-      </p:pic>
-      <p:pic>
-        <p:nvPicPr>
-          <p:cNvPr id="11" name="Immagine 10">
-            <a:extLst>
-              <a:ext uri="{FF2B5EF4-FFF2-40B4-BE49-F238E27FC236}">
-                <a16:creationId xmlns:a16="http://schemas.microsoft.com/office/drawing/2014/main" id="{C23277DD-9E95-2566-1CB0-D62BF9839433}"/>
-              </a:ext>
-            </a:extLst>
-          </p:cNvPr>
-          <p:cNvPicPr>
-            <a:picLocks noChangeAspect="1"/>
-          </p:cNvPicPr>
-          <p:nvPr/>
-        </p:nvPicPr>
-        <p:blipFill>
-          <a:blip r:embed="rId4"/>
-          <a:stretch>
-            <a:fillRect/>
-          </a:stretch>
-        </p:blipFill>
-        <p:spPr>
-          <a:xfrm>
-            <a:off x="7067605" y="4896760"/>
-            <a:ext cx="1776241" cy="825895"/>
+            <a:off x="2162273" y="1978906"/>
+            <a:ext cx="4687101" cy="2900188"/>
           </a:xfrm>
           <a:prstGeom prst="rect">
             <a:avLst/>
@@ -5828,7 +5670,7 @@
     </p:spTree>
     <p:extLst>
       <p:ext uri="{BB962C8B-B14F-4D97-AF65-F5344CB8AC3E}">
-        <p14:creationId xmlns:p14="http://schemas.microsoft.com/office/powerpoint/2010/main" val="888774464"/>
+        <p14:creationId xmlns:p14="http://schemas.microsoft.com/office/powerpoint/2010/main" val="207736931"/>
       </p:ext>
     </p:extLst>
   </p:cSld>
@@ -6143,12 +5985,177 @@
           </a:p>
         </p:txBody>
       </p:sp>
+      <p:sp>
+        <p:nvSpPr>
+          <p:cNvPr id="9" name="CasellaDiTesto 8">
+            <a:extLst>
+              <a:ext uri="{FF2B5EF4-FFF2-40B4-BE49-F238E27FC236}">
+                <a16:creationId xmlns:a16="http://schemas.microsoft.com/office/drawing/2014/main" id="{4B6313EF-3010-D4E4-5F5D-1FF5C2A34D0E}"/>
+              </a:ext>
+            </a:extLst>
+          </p:cNvPr>
+          <p:cNvSpPr txBox="1"/>
+          <p:nvPr/>
+        </p:nvSpPr>
+        <p:spPr>
+          <a:xfrm>
+            <a:off x="484246" y="1557431"/>
+            <a:ext cx="7769737" cy="4801314"/>
+          </a:xfrm>
+          <a:prstGeom prst="rect">
+            <a:avLst/>
+          </a:prstGeom>
+          <a:noFill/>
+        </p:spPr>
+        <p:txBody>
+          <a:bodyPr wrap="square" rtlCol="0">
+            <a:spAutoFit/>
+          </a:bodyPr>
+          <a:lstStyle/>
+          <a:p>
+            <a:pPr marL="285750" indent="-285750">
+              <a:buFont typeface="Arial" panose="020B0604020202020204" pitchFamily="34" charset="0"/>
+              <a:buChar char="•"/>
+            </a:pPr>
+            <a:r>
+              <a:rPr lang="it-IT" dirty="0"/>
+              <a:t>Ridefinizione di funzionalità per il contesto di una classe </a:t>
+            </a:r>
+          </a:p>
+          <a:p>
+            <a:pPr marL="742950" lvl="1" indent="-285750">
+              <a:buFont typeface="Arial" panose="020B0604020202020204" pitchFamily="34" charset="0"/>
+              <a:buChar char="•"/>
+            </a:pPr>
+            <a:r>
+              <a:rPr lang="it-IT" dirty="0"/>
+              <a:t>(e.g. somma di orari in </a:t>
+            </a:r>
+            <a:r>
+              <a:rPr lang="it-IT" dirty="0">
+                <a:latin typeface="Consolas" panose="020B0609020204030204" pitchFamily="49" charset="0"/>
+              </a:rPr>
+              <a:t>Orario</a:t>
+            </a:r>
+            <a:r>
+              <a:rPr lang="it-IT" dirty="0"/>
+              <a:t>)</a:t>
+            </a:r>
+          </a:p>
+          <a:p>
+            <a:pPr marL="285750" indent="-285750">
+              <a:buFont typeface="Arial" panose="020B0604020202020204" pitchFamily="34" charset="0"/>
+              <a:buChar char="•"/>
+            </a:pPr>
+            <a:endParaRPr lang="it-IT" dirty="0"/>
+          </a:p>
+          <a:p>
+            <a:pPr marL="285750" indent="-285750">
+              <a:buFont typeface="Arial" panose="020B0604020202020204" pitchFamily="34" charset="0"/>
+              <a:buChar char="•"/>
+            </a:pPr>
+            <a:r>
+              <a:rPr lang="it-IT" dirty="0"/>
+              <a:t>Tali funzionalità vengono definite mediante l’uso di operatori</a:t>
+            </a:r>
+          </a:p>
+          <a:p>
+            <a:pPr marL="285750" indent="-285750">
+              <a:buFont typeface="Arial" panose="020B0604020202020204" pitchFamily="34" charset="0"/>
+              <a:buChar char="•"/>
+            </a:pPr>
+            <a:endParaRPr lang="it-IT" dirty="0"/>
+          </a:p>
+          <a:p>
+            <a:pPr marL="285750" indent="-285750">
+              <a:buFont typeface="Arial" panose="020B0604020202020204" pitchFamily="34" charset="0"/>
+              <a:buChar char="•"/>
+            </a:pPr>
+            <a:endParaRPr lang="it-IT" dirty="0"/>
+          </a:p>
+          <a:p>
+            <a:pPr marL="285750" indent="-285750">
+              <a:buFont typeface="Arial" panose="020B0604020202020204" pitchFamily="34" charset="0"/>
+              <a:buChar char="•"/>
+            </a:pPr>
+            <a:endParaRPr lang="it-IT" dirty="0"/>
+          </a:p>
+          <a:p>
+            <a:pPr marL="285750" indent="-285750">
+              <a:buFont typeface="Arial" panose="020B0604020202020204" pitchFamily="34" charset="0"/>
+              <a:buChar char="•"/>
+            </a:pPr>
+            <a:endParaRPr lang="it-IT" dirty="0"/>
+          </a:p>
+          <a:p>
+            <a:pPr marL="285750" indent="-285750">
+              <a:buFont typeface="Arial" panose="020B0604020202020204" pitchFamily="34" charset="0"/>
+              <a:buChar char="•"/>
+            </a:pPr>
+            <a:r>
+              <a:rPr lang="it-IT" dirty="0"/>
+              <a:t>Caso importante:</a:t>
+            </a:r>
+          </a:p>
+          <a:p>
+            <a:pPr marL="742950" lvl="1" indent="-285750">
+              <a:buFont typeface="Arial" panose="020B0604020202020204" pitchFamily="34" charset="0"/>
+              <a:buChar char="•"/>
+            </a:pPr>
+            <a:r>
+              <a:rPr lang="it-IT" u="sng" dirty="0"/>
+              <a:t>Assegnazione standard</a:t>
+            </a:r>
+          </a:p>
+          <a:p>
+            <a:pPr lvl="1"/>
+            <a:endParaRPr lang="it-IT" dirty="0"/>
+          </a:p>
+          <a:p>
+            <a:pPr lvl="1"/>
+            <a:endParaRPr lang="it-IT" dirty="0"/>
+          </a:p>
+          <a:p>
+            <a:pPr lvl="1"/>
+            <a:endParaRPr lang="it-IT" dirty="0"/>
+          </a:p>
+          <a:p>
+            <a:pPr lvl="1"/>
+            <a:endParaRPr lang="it-IT" dirty="0"/>
+          </a:p>
+          <a:p>
+            <a:pPr marL="742950" lvl="1" indent="-285750">
+              <a:buFont typeface="Arial" panose="020B0604020202020204" pitchFamily="34" charset="0"/>
+              <a:buChar char="•"/>
+            </a:pPr>
+            <a:r>
+              <a:rPr lang="it-IT" dirty="0"/>
+              <a:t>Simile all’assegnazione standard, vi è il </a:t>
+            </a:r>
+            <a:r>
+              <a:rPr lang="it-IT" u="sng" dirty="0"/>
+              <a:t>costruttore di copia</a:t>
+            </a:r>
+          </a:p>
+          <a:p>
+            <a:pPr lvl="1"/>
+            <a:endParaRPr lang="it-IT" dirty="0"/>
+          </a:p>
+          <a:p>
+            <a:pPr marL="285750" indent="-285750">
+              <a:buFont typeface="Arial" panose="020B0604020202020204" pitchFamily="34" charset="0"/>
+              <a:buChar char="•"/>
+            </a:pPr>
+            <a:endParaRPr lang="it-IT" dirty="0"/>
+          </a:p>
+        </p:txBody>
+      </p:sp>
       <p:pic>
         <p:nvPicPr>
           <p:cNvPr id="5" name="Immagine 4">
             <a:extLst>
               <a:ext uri="{FF2B5EF4-FFF2-40B4-BE49-F238E27FC236}">
-                <a16:creationId xmlns:a16="http://schemas.microsoft.com/office/drawing/2014/main" id="{5C266208-244E-2124-E579-1836727D1A0C}"/>
+                <a16:creationId xmlns:a16="http://schemas.microsoft.com/office/drawing/2014/main" id="{C62E3CCC-934F-C007-76CB-21E517C631BB}"/>
               </a:ext>
             </a:extLst>
           </p:cNvPr>
@@ -6165,69 +6172,20 @@
         </p:blipFill>
         <p:spPr>
           <a:xfrm>
-            <a:off x="941401" y="1523695"/>
-            <a:ext cx="7553805" cy="2148927"/>
+            <a:off x="1521039" y="2752594"/>
+            <a:ext cx="6101922" cy="608095"/>
           </a:xfrm>
           <a:prstGeom prst="rect">
             <a:avLst/>
           </a:prstGeom>
         </p:spPr>
       </p:pic>
-      <p:sp>
-        <p:nvSpPr>
-          <p:cNvPr id="7" name="CasellaDiTesto 6">
-            <a:extLst>
-              <a:ext uri="{FF2B5EF4-FFF2-40B4-BE49-F238E27FC236}">
-                <a16:creationId xmlns:a16="http://schemas.microsoft.com/office/drawing/2014/main" id="{8545F119-2EA8-E1B2-1131-3546AF4257DC}"/>
-              </a:ext>
-            </a:extLst>
-          </p:cNvPr>
-          <p:cNvSpPr txBox="1"/>
-          <p:nvPr/>
-        </p:nvSpPr>
-        <p:spPr>
-          <a:xfrm>
-            <a:off x="417145" y="3758726"/>
-            <a:ext cx="7769737" cy="646331"/>
-          </a:xfrm>
-          <a:prstGeom prst="rect">
-            <a:avLst/>
-          </a:prstGeom>
-          <a:noFill/>
-        </p:spPr>
-        <p:txBody>
-          <a:bodyPr wrap="square" rtlCol="0">
-            <a:spAutoFit/>
-          </a:bodyPr>
-          <a:lstStyle/>
-          <a:p>
-            <a:pPr marL="742950" lvl="1" indent="-285750">
-              <a:buFont typeface="Arial" panose="020B0604020202020204" pitchFamily="34" charset="0"/>
-              <a:buChar char="•"/>
-            </a:pPr>
-            <a:r>
-              <a:rPr lang="it-IT" dirty="0"/>
-              <a:t>Operatori particolari</a:t>
-            </a:r>
-          </a:p>
-          <a:p>
-            <a:pPr marL="1200150" lvl="2" indent="-285750">
-              <a:buFont typeface="Arial" panose="020B0604020202020204" pitchFamily="34" charset="0"/>
-              <a:buChar char="•"/>
-            </a:pPr>
-            <a:r>
-              <a:rPr lang="it-IT" dirty="0"/>
-              <a:t>Operatore ternario</a:t>
-            </a:r>
-          </a:p>
-        </p:txBody>
-      </p:sp>
       <p:pic>
         <p:nvPicPr>
-          <p:cNvPr id="9" name="Immagine 8">
-            <a:extLst>
-              <a:ext uri="{FF2B5EF4-FFF2-40B4-BE49-F238E27FC236}">
-                <a16:creationId xmlns:a16="http://schemas.microsoft.com/office/drawing/2014/main" id="{D52256D4-D525-4959-4B82-56E0F6AA06E1}"/>
+          <p:cNvPr id="6" name="Immagine 5">
+            <a:extLst>
+              <a:ext uri="{FF2B5EF4-FFF2-40B4-BE49-F238E27FC236}">
+                <a16:creationId xmlns:a16="http://schemas.microsoft.com/office/drawing/2014/main" id="{922C048C-1D1C-6906-FC68-86C1DAEF2EEF}"/>
               </a:ext>
             </a:extLst>
           </p:cNvPr>
@@ -6244,8 +6202,38 @@
         </p:blipFill>
         <p:spPr>
           <a:xfrm>
-            <a:off x="1749229" y="4418858"/>
-            <a:ext cx="5645542" cy="1192566"/>
+            <a:off x="4517355" y="3637216"/>
+            <a:ext cx="2685674" cy="779050"/>
+          </a:xfrm>
+          <a:prstGeom prst="rect">
+            <a:avLst/>
+          </a:prstGeom>
+        </p:spPr>
+      </p:pic>
+      <p:pic>
+        <p:nvPicPr>
+          <p:cNvPr id="11" name="Immagine 10">
+            <a:extLst>
+              <a:ext uri="{FF2B5EF4-FFF2-40B4-BE49-F238E27FC236}">
+                <a16:creationId xmlns:a16="http://schemas.microsoft.com/office/drawing/2014/main" id="{C23277DD-9E95-2566-1CB0-D62BF9839433}"/>
+              </a:ext>
+            </a:extLst>
+          </p:cNvPr>
+          <p:cNvPicPr>
+            <a:picLocks noChangeAspect="1"/>
+          </p:cNvPicPr>
+          <p:nvPr/>
+        </p:nvPicPr>
+        <p:blipFill>
+          <a:blip r:embed="rId4"/>
+          <a:stretch>
+            <a:fillRect/>
+          </a:stretch>
+        </p:blipFill>
+        <p:spPr>
+          <a:xfrm>
+            <a:off x="7067605" y="4896760"/>
+            <a:ext cx="1776241" cy="825895"/>
           </a:xfrm>
           <a:prstGeom prst="rect">
             <a:avLst/>
@@ -6255,7 +6243,7 @@
     </p:spTree>
     <p:extLst>
       <p:ext uri="{BB962C8B-B14F-4D97-AF65-F5344CB8AC3E}">
-        <p14:creationId xmlns:p14="http://schemas.microsoft.com/office/powerpoint/2010/main" val="683277579"/>
+        <p14:creationId xmlns:p14="http://schemas.microsoft.com/office/powerpoint/2010/main" val="888774464"/>
       </p:ext>
     </p:extLst>
   </p:cSld>
@@ -6331,218 +6319,15 @@
           <a:bodyPr/>
           <a:lstStyle/>
           <a:p>
+            <a:fld id="{4D021CEB-2F22-4EA1-9BAF-E3833982B82A}" type="slidenum">
+              <a:rPr lang="en-US" smtClean="0"/>
+              <a:pPr/>
+              <a:t>31</a:t>
+            </a:fld>
             <a:r>
               <a:rPr lang="en-US" dirty="0"/>
-              <a:t>31 di 35</a:t>
-            </a:r>
-          </a:p>
-        </p:txBody>
-      </p:sp>
-      <p:sp>
-        <p:nvSpPr>
-          <p:cNvPr id="9" name="CasellaDiTesto 8">
-            <a:extLst>
-              <a:ext uri="{FF2B5EF4-FFF2-40B4-BE49-F238E27FC236}">
-                <a16:creationId xmlns:a16="http://schemas.microsoft.com/office/drawing/2014/main" id="{4B6313EF-3010-D4E4-5F5D-1FF5C2A34D0E}"/>
-              </a:ext>
-            </a:extLst>
-          </p:cNvPr>
-          <p:cNvSpPr txBox="1"/>
-          <p:nvPr/>
-        </p:nvSpPr>
-        <p:spPr>
-          <a:xfrm>
-            <a:off x="484246" y="1557431"/>
-            <a:ext cx="7769737" cy="5139869"/>
-          </a:xfrm>
-          <a:prstGeom prst="rect">
-            <a:avLst/>
-          </a:prstGeom>
-          <a:noFill/>
-        </p:spPr>
-        <p:txBody>
-          <a:bodyPr wrap="square" rtlCol="0">
-            <a:spAutoFit/>
-          </a:bodyPr>
-          <a:lstStyle/>
-          <a:p>
-            <a:pPr marL="285750" indent="-285750">
-              <a:buFont typeface="Arial" panose="020B0604020202020204" pitchFamily="34" charset="0"/>
-              <a:buChar char="•"/>
-            </a:pPr>
-            <a:r>
-              <a:rPr lang="it-IT" dirty="0"/>
-              <a:t>Si possono sovraccaricare degli operatori come funzioni esterne</a:t>
-            </a:r>
-          </a:p>
-          <a:p>
-            <a:pPr marL="1200150" lvl="2" indent="-285750">
-              <a:buFont typeface="Arial" panose="020B0604020202020204" pitchFamily="34" charset="0"/>
-              <a:buChar char="•"/>
-            </a:pPr>
-            <a:r>
-              <a:rPr lang="it-IT" dirty="0"/>
-              <a:t>Operatore di stampa</a:t>
-            </a:r>
-          </a:p>
-          <a:p>
-            <a:pPr marL="1200150" lvl="2" indent="-285750">
-              <a:buFont typeface="Arial" panose="020B0604020202020204" pitchFamily="34" charset="0"/>
-              <a:buChar char="•"/>
-            </a:pPr>
-            <a:endParaRPr lang="it-IT" dirty="0"/>
-          </a:p>
-          <a:p>
-            <a:pPr marL="1200150" lvl="2" indent="-285750">
-              <a:buFont typeface="Arial" panose="020B0604020202020204" pitchFamily="34" charset="0"/>
-              <a:buChar char="•"/>
-            </a:pPr>
-            <a:endParaRPr lang="it-IT" dirty="0"/>
-          </a:p>
-          <a:p>
-            <a:pPr marL="1200150" lvl="2" indent="-285750">
-              <a:buFont typeface="Arial" panose="020B0604020202020204" pitchFamily="34" charset="0"/>
-              <a:buChar char="•"/>
-            </a:pPr>
-            <a:endParaRPr lang="it-IT" dirty="0"/>
-          </a:p>
-          <a:p>
-            <a:pPr marL="1200150" lvl="2" indent="-285750">
-              <a:buFont typeface="Arial" panose="020B0604020202020204" pitchFamily="34" charset="0"/>
-              <a:buChar char="•"/>
-            </a:pPr>
-            <a:endParaRPr lang="it-IT" dirty="0"/>
-          </a:p>
-          <a:p>
-            <a:endParaRPr lang="it-IT" dirty="0"/>
-          </a:p>
-          <a:p>
-            <a:pPr marL="285750" indent="-285750">
-              <a:buFont typeface="Arial" panose="020B0604020202020204" pitchFamily="34" charset="0"/>
-              <a:buChar char="•"/>
-            </a:pPr>
-            <a:r>
-              <a:rPr lang="it-IT" sz="1600" dirty="0"/>
-              <a:t>Altri esempi di overloading</a:t>
-            </a:r>
-          </a:p>
-          <a:p>
-            <a:pPr marL="742950" lvl="1" indent="-285750">
-              <a:buFont typeface="Arial" panose="020B0604020202020204" pitchFamily="34" charset="0"/>
-              <a:buChar char="•"/>
-            </a:pPr>
-            <a:r>
-              <a:rPr lang="it-IT" sz="1600" dirty="0"/>
-              <a:t>operator + (somma)</a:t>
-            </a:r>
-          </a:p>
-          <a:p>
-            <a:pPr marL="742950" lvl="1" indent="-285750">
-              <a:buFont typeface="Arial" panose="020B0604020202020204" pitchFamily="34" charset="0"/>
-              <a:buChar char="•"/>
-            </a:pPr>
-            <a:r>
-              <a:rPr lang="it-IT" sz="1600" dirty="0"/>
-              <a:t>operator == (confronto)</a:t>
-            </a:r>
-          </a:p>
-          <a:p>
-            <a:endParaRPr lang="it-IT" sz="1600" dirty="0"/>
-          </a:p>
-          <a:p>
-            <a:pPr marL="285750" indent="-285750">
-              <a:buFont typeface="Arial" panose="020B0604020202020204" pitchFamily="34" charset="0"/>
-              <a:buChar char="•"/>
-            </a:pPr>
-            <a:r>
-              <a:rPr lang="it-IT" sz="1600" dirty="0"/>
-              <a:t>Altri operatori che ci saranno utili successivamente:</a:t>
-            </a:r>
-          </a:p>
-          <a:p>
-            <a:pPr marL="742950" lvl="1" indent="-285750">
-              <a:buFont typeface="Arial" panose="020B0604020202020204" pitchFamily="34" charset="0"/>
-              <a:buChar char="•"/>
-            </a:pPr>
-            <a:r>
-              <a:rPr lang="it-IT" sz="1600" dirty="0"/>
-              <a:t>operator * (referenziazione)</a:t>
-            </a:r>
-          </a:p>
-          <a:p>
-            <a:pPr marL="742950" lvl="1" indent="-285750">
-              <a:buFont typeface="Arial" panose="020B0604020202020204" pitchFamily="34" charset="0"/>
-              <a:buChar char="•"/>
-            </a:pPr>
-            <a:r>
-              <a:rPr lang="it-IT" sz="1600" dirty="0"/>
-              <a:t>operator &amp; (dereferenziazione)</a:t>
-            </a:r>
-          </a:p>
-          <a:p>
-            <a:pPr marL="742950" lvl="1" indent="-285750">
-              <a:buFont typeface="Arial" panose="020B0604020202020204" pitchFamily="34" charset="0"/>
-              <a:buChar char="•"/>
-            </a:pPr>
-            <a:r>
-              <a:rPr lang="it-IT" sz="1600" dirty="0"/>
-              <a:t>operator </a:t>
-            </a:r>
-            <a:r>
-              <a:rPr lang="it-IT" sz="1600" dirty="0">
-                <a:sym typeface="Wingdings" panose="05000000000000000000" pitchFamily="2" charset="2"/>
-              </a:rPr>
-              <a:t>-&gt; (selezione a membro)</a:t>
-            </a:r>
-          </a:p>
-          <a:p>
-            <a:pPr marL="742950" lvl="1" indent="-285750">
-              <a:buFont typeface="Arial" panose="020B0604020202020204" pitchFamily="34" charset="0"/>
-              <a:buChar char="•"/>
-            </a:pPr>
-            <a:r>
-              <a:rPr lang="it-IT" sz="1600" dirty="0">
-                <a:sym typeface="Wingdings" panose="05000000000000000000" pitchFamily="2" charset="2"/>
-              </a:rPr>
-              <a:t>operator [] (indicizzazione)</a:t>
-            </a:r>
-          </a:p>
-          <a:p>
-            <a:pPr marL="742950" lvl="1" indent="-285750">
-              <a:buFont typeface="Arial" panose="020B0604020202020204" pitchFamily="34" charset="0"/>
-              <a:buChar char="•"/>
-            </a:pPr>
-            <a:r>
-              <a:rPr lang="it-IT" sz="1600" dirty="0">
-                <a:sym typeface="Wingdings" panose="05000000000000000000" pitchFamily="2" charset="2"/>
-              </a:rPr>
-              <a:t>operator ++ (somma</a:t>
-            </a:r>
-          </a:p>
-          <a:p>
-            <a:pPr marL="1200150" lvl="2" indent="-285750">
-              <a:buFont typeface="Arial" panose="020B0604020202020204" pitchFamily="34" charset="0"/>
-              <a:buChar char="•"/>
-            </a:pPr>
-            <a:r>
-              <a:rPr lang="it-IT" sz="1600" dirty="0">
-                <a:sym typeface="Wingdings" panose="05000000000000000000" pitchFamily="2" charset="2"/>
-              </a:rPr>
-              <a:t>Incremento prefisso</a:t>
-            </a:r>
-          </a:p>
-          <a:p>
-            <a:pPr marL="1200150" lvl="2" indent="-285750">
-              <a:buFont typeface="Arial" panose="020B0604020202020204" pitchFamily="34" charset="0"/>
-              <a:buChar char="•"/>
-            </a:pPr>
-            <a:r>
-              <a:rPr lang="it-IT" sz="1600" dirty="0">
-                <a:sym typeface="Wingdings" panose="05000000000000000000" pitchFamily="2" charset="2"/>
-              </a:rPr>
-              <a:t>Incremento postfisso</a:t>
-            </a:r>
-            <a:endParaRPr lang="it-IT" sz="1600" dirty="0"/>
+              <a:t> di 35</a:t>
+            </a:r>
           </a:p>
         </p:txBody>
       </p:sp>
@@ -6551,7 +6336,7 @@
           <p:cNvPr id="5" name="Immagine 4">
             <a:extLst>
               <a:ext uri="{FF2B5EF4-FFF2-40B4-BE49-F238E27FC236}">
-                <a16:creationId xmlns:a16="http://schemas.microsoft.com/office/drawing/2014/main" id="{94321918-A2BB-26A5-A7AA-5C16727A9E4B}"/>
+                <a16:creationId xmlns:a16="http://schemas.microsoft.com/office/drawing/2014/main" id="{5C266208-244E-2124-E579-1836727D1A0C}"/>
               </a:ext>
             </a:extLst>
           </p:cNvPr>
@@ -6568,8 +6353,87 @@
         </p:blipFill>
         <p:spPr>
           <a:xfrm>
-            <a:off x="1472266" y="2228574"/>
-            <a:ext cx="6056433" cy="1109849"/>
+            <a:off x="941401" y="1523695"/>
+            <a:ext cx="7553805" cy="2148927"/>
+          </a:xfrm>
+          <a:prstGeom prst="rect">
+            <a:avLst/>
+          </a:prstGeom>
+        </p:spPr>
+      </p:pic>
+      <p:sp>
+        <p:nvSpPr>
+          <p:cNvPr id="7" name="CasellaDiTesto 6">
+            <a:extLst>
+              <a:ext uri="{FF2B5EF4-FFF2-40B4-BE49-F238E27FC236}">
+                <a16:creationId xmlns:a16="http://schemas.microsoft.com/office/drawing/2014/main" id="{8545F119-2EA8-E1B2-1131-3546AF4257DC}"/>
+              </a:ext>
+            </a:extLst>
+          </p:cNvPr>
+          <p:cNvSpPr txBox="1"/>
+          <p:nvPr/>
+        </p:nvSpPr>
+        <p:spPr>
+          <a:xfrm>
+            <a:off x="417145" y="3758726"/>
+            <a:ext cx="7769737" cy="646331"/>
+          </a:xfrm>
+          <a:prstGeom prst="rect">
+            <a:avLst/>
+          </a:prstGeom>
+          <a:noFill/>
+        </p:spPr>
+        <p:txBody>
+          <a:bodyPr wrap="square" rtlCol="0">
+            <a:spAutoFit/>
+          </a:bodyPr>
+          <a:lstStyle/>
+          <a:p>
+            <a:pPr marL="742950" lvl="1" indent="-285750">
+              <a:buFont typeface="Arial" panose="020B0604020202020204" pitchFamily="34" charset="0"/>
+              <a:buChar char="•"/>
+            </a:pPr>
+            <a:r>
+              <a:rPr lang="it-IT" dirty="0"/>
+              <a:t>Operatori particolari</a:t>
+            </a:r>
+          </a:p>
+          <a:p>
+            <a:pPr marL="1200150" lvl="2" indent="-285750">
+              <a:buFont typeface="Arial" panose="020B0604020202020204" pitchFamily="34" charset="0"/>
+              <a:buChar char="•"/>
+            </a:pPr>
+            <a:r>
+              <a:rPr lang="it-IT" dirty="0"/>
+              <a:t>Operatore ternario</a:t>
+            </a:r>
+          </a:p>
+        </p:txBody>
+      </p:sp>
+      <p:pic>
+        <p:nvPicPr>
+          <p:cNvPr id="9" name="Immagine 8">
+            <a:extLst>
+              <a:ext uri="{FF2B5EF4-FFF2-40B4-BE49-F238E27FC236}">
+                <a16:creationId xmlns:a16="http://schemas.microsoft.com/office/drawing/2014/main" id="{D52256D4-D525-4959-4B82-56E0F6AA06E1}"/>
+              </a:ext>
+            </a:extLst>
+          </p:cNvPr>
+          <p:cNvPicPr>
+            <a:picLocks noChangeAspect="1"/>
+          </p:cNvPicPr>
+          <p:nvPr/>
+        </p:nvPicPr>
+        <p:blipFill>
+          <a:blip r:embed="rId3"/>
+          <a:stretch>
+            <a:fillRect/>
+          </a:stretch>
+        </p:blipFill>
+        <p:spPr>
+          <a:xfrm>
+            <a:off x="1749229" y="4418858"/>
+            <a:ext cx="5645542" cy="1192566"/>
           </a:xfrm>
           <a:prstGeom prst="rect">
             <a:avLst/>
@@ -6579,7 +6443,7 @@
     </p:spTree>
     <p:extLst>
       <p:ext uri="{BB962C8B-B14F-4D97-AF65-F5344CB8AC3E}">
-        <p14:creationId xmlns:p14="http://schemas.microsoft.com/office/powerpoint/2010/main" val="3452887810"/>
+        <p14:creationId xmlns:p14="http://schemas.microsoft.com/office/powerpoint/2010/main" val="683277579"/>
       </p:ext>
     </p:extLst>
   </p:cSld>
@@ -6655,151 +6519,255 @@
           <a:bodyPr/>
           <a:lstStyle/>
           <a:p>
-            <a:fld id="{4D021CEB-2F22-4EA1-9BAF-E3833982B82A}" type="slidenum">
-              <a:rPr lang="en-US" smtClean="0"/>
-              <a:pPr/>
-              <a:t>32</a:t>
-            </a:fld>
             <a:r>
               <a:rPr lang="en-US" dirty="0"/>
-              <a:t> di 35</a:t>
-            </a:r>
+              <a:t>31 di 35</a:t>
+            </a:r>
+          </a:p>
+        </p:txBody>
+      </p:sp>
+      <p:sp>
+        <p:nvSpPr>
+          <p:cNvPr id="9" name="CasellaDiTesto 8">
+            <a:extLst>
+              <a:ext uri="{FF2B5EF4-FFF2-40B4-BE49-F238E27FC236}">
+                <a16:creationId xmlns:a16="http://schemas.microsoft.com/office/drawing/2014/main" id="{4B6313EF-3010-D4E4-5F5D-1FF5C2A34D0E}"/>
+              </a:ext>
+            </a:extLst>
+          </p:cNvPr>
+          <p:cNvSpPr txBox="1"/>
+          <p:nvPr/>
+        </p:nvSpPr>
+        <p:spPr>
+          <a:xfrm>
+            <a:off x="484246" y="1557431"/>
+            <a:ext cx="7769737" cy="5139869"/>
+          </a:xfrm>
+          <a:prstGeom prst="rect">
+            <a:avLst/>
+          </a:prstGeom>
+          <a:noFill/>
+        </p:spPr>
+        <p:txBody>
+          <a:bodyPr wrap="square" rtlCol="0">
+            <a:spAutoFit/>
+          </a:bodyPr>
+          <a:lstStyle/>
+          <a:p>
+            <a:pPr marL="285750" indent="-285750">
+              <a:buFont typeface="Arial" panose="020B0604020202020204" pitchFamily="34" charset="0"/>
+              <a:buChar char="•"/>
+            </a:pPr>
+            <a:r>
+              <a:rPr lang="it-IT" dirty="0"/>
+              <a:t>Si possono sovraccaricare degli operatori come funzioni esterne</a:t>
+            </a:r>
+          </a:p>
+          <a:p>
+            <a:pPr marL="1200150" lvl="2" indent="-285750">
+              <a:buFont typeface="Arial" panose="020B0604020202020204" pitchFamily="34" charset="0"/>
+              <a:buChar char="•"/>
+            </a:pPr>
+            <a:r>
+              <a:rPr lang="it-IT" dirty="0"/>
+              <a:t>Operatore di stampa</a:t>
+            </a:r>
+          </a:p>
+          <a:p>
+            <a:pPr marL="1200150" lvl="2" indent="-285750">
+              <a:buFont typeface="Arial" panose="020B0604020202020204" pitchFamily="34" charset="0"/>
+              <a:buChar char="•"/>
+            </a:pPr>
+            <a:endParaRPr lang="it-IT" dirty="0"/>
+          </a:p>
+          <a:p>
+            <a:pPr marL="1200150" lvl="2" indent="-285750">
+              <a:buFont typeface="Arial" panose="020B0604020202020204" pitchFamily="34" charset="0"/>
+              <a:buChar char="•"/>
+            </a:pPr>
+            <a:endParaRPr lang="it-IT" dirty="0"/>
+          </a:p>
+          <a:p>
+            <a:pPr marL="1200150" lvl="2" indent="-285750">
+              <a:buFont typeface="Arial" panose="020B0604020202020204" pitchFamily="34" charset="0"/>
+              <a:buChar char="•"/>
+            </a:pPr>
+            <a:endParaRPr lang="it-IT" dirty="0"/>
+          </a:p>
+          <a:p>
+            <a:pPr marL="1200150" lvl="2" indent="-285750">
+              <a:buFont typeface="Arial" panose="020B0604020202020204" pitchFamily="34" charset="0"/>
+              <a:buChar char="•"/>
+            </a:pPr>
+            <a:endParaRPr lang="it-IT" dirty="0"/>
+          </a:p>
+          <a:p>
+            <a:endParaRPr lang="it-IT" dirty="0"/>
+          </a:p>
+          <a:p>
+            <a:pPr marL="285750" indent="-285750">
+              <a:buFont typeface="Arial" panose="020B0604020202020204" pitchFamily="34" charset="0"/>
+              <a:buChar char="•"/>
+            </a:pPr>
+            <a:r>
+              <a:rPr lang="it-IT" sz="1600" dirty="0"/>
+              <a:t>Altri esempi di overloading</a:t>
+            </a:r>
+          </a:p>
+          <a:p>
+            <a:pPr marL="742950" lvl="1" indent="-285750">
+              <a:buFont typeface="Arial" panose="020B0604020202020204" pitchFamily="34" charset="0"/>
+              <a:buChar char="•"/>
+            </a:pPr>
+            <a:r>
+              <a:rPr lang="it-IT" sz="1600" dirty="0"/>
+              <a:t>operator + (somma)</a:t>
+            </a:r>
+          </a:p>
+          <a:p>
+            <a:pPr marL="742950" lvl="1" indent="-285750">
+              <a:buFont typeface="Arial" panose="020B0604020202020204" pitchFamily="34" charset="0"/>
+              <a:buChar char="•"/>
+            </a:pPr>
+            <a:r>
+              <a:rPr lang="it-IT" sz="1600" dirty="0"/>
+              <a:t>operator == (confronto)</a:t>
+            </a:r>
+          </a:p>
+          <a:p>
+            <a:endParaRPr lang="it-IT" sz="1600" dirty="0"/>
+          </a:p>
+          <a:p>
+            <a:pPr marL="285750" indent="-285750">
+              <a:buFont typeface="Arial" panose="020B0604020202020204" pitchFamily="34" charset="0"/>
+              <a:buChar char="•"/>
+            </a:pPr>
+            <a:r>
+              <a:rPr lang="it-IT" sz="1600" dirty="0"/>
+              <a:t>Altri operatori che ci saranno utili successivamente:</a:t>
+            </a:r>
+          </a:p>
+          <a:p>
+            <a:pPr marL="742950" lvl="1" indent="-285750">
+              <a:buFont typeface="Arial" panose="020B0604020202020204" pitchFamily="34" charset="0"/>
+              <a:buChar char="•"/>
+            </a:pPr>
+            <a:r>
+              <a:rPr lang="it-IT" sz="1600" dirty="0"/>
+              <a:t>operator * (referenziazione)</a:t>
+            </a:r>
+          </a:p>
+          <a:p>
+            <a:pPr marL="742950" lvl="1" indent="-285750">
+              <a:buFont typeface="Arial" panose="020B0604020202020204" pitchFamily="34" charset="0"/>
+              <a:buChar char="•"/>
+            </a:pPr>
+            <a:r>
+              <a:rPr lang="it-IT" sz="1600" dirty="0"/>
+              <a:t>operator &amp; (dereferenziazione)</a:t>
+            </a:r>
+          </a:p>
+          <a:p>
+            <a:pPr marL="742950" lvl="1" indent="-285750">
+              <a:buFont typeface="Arial" panose="020B0604020202020204" pitchFamily="34" charset="0"/>
+              <a:buChar char="•"/>
+            </a:pPr>
+            <a:r>
+              <a:rPr lang="it-IT" sz="1600" dirty="0"/>
+              <a:t>operator </a:t>
+            </a:r>
+            <a:r>
+              <a:rPr lang="it-IT" sz="1600" dirty="0">
+                <a:sym typeface="Wingdings" panose="05000000000000000000" pitchFamily="2" charset="2"/>
+              </a:rPr>
+              <a:t>-&gt; (selezione a membro)</a:t>
+            </a:r>
+          </a:p>
+          <a:p>
+            <a:pPr marL="742950" lvl="1" indent="-285750">
+              <a:buFont typeface="Arial" panose="020B0604020202020204" pitchFamily="34" charset="0"/>
+              <a:buChar char="•"/>
+            </a:pPr>
+            <a:r>
+              <a:rPr lang="it-IT" sz="1600" dirty="0">
+                <a:sym typeface="Wingdings" panose="05000000000000000000" pitchFamily="2" charset="2"/>
+              </a:rPr>
+              <a:t>operator [] (indicizzazione)</a:t>
+            </a:r>
+          </a:p>
+          <a:p>
+            <a:pPr marL="742950" lvl="1" indent="-285750">
+              <a:buFont typeface="Arial" panose="020B0604020202020204" pitchFamily="34" charset="0"/>
+              <a:buChar char="•"/>
+            </a:pPr>
+            <a:r>
+              <a:rPr lang="it-IT" sz="1600" dirty="0">
+                <a:sym typeface="Wingdings" panose="05000000000000000000" pitchFamily="2" charset="2"/>
+              </a:rPr>
+              <a:t>operator ++ (somma</a:t>
+            </a:r>
+          </a:p>
+          <a:p>
+            <a:pPr marL="1200150" lvl="2" indent="-285750">
+              <a:buFont typeface="Arial" panose="020B0604020202020204" pitchFamily="34" charset="0"/>
+              <a:buChar char="•"/>
+            </a:pPr>
+            <a:r>
+              <a:rPr lang="it-IT" sz="1600" dirty="0">
+                <a:sym typeface="Wingdings" panose="05000000000000000000" pitchFamily="2" charset="2"/>
+              </a:rPr>
+              <a:t>Incremento prefisso</a:t>
+            </a:r>
+          </a:p>
+          <a:p>
+            <a:pPr marL="1200150" lvl="2" indent="-285750">
+              <a:buFont typeface="Arial" panose="020B0604020202020204" pitchFamily="34" charset="0"/>
+              <a:buChar char="•"/>
+            </a:pPr>
+            <a:r>
+              <a:rPr lang="it-IT" sz="1600" dirty="0">
+                <a:sym typeface="Wingdings" panose="05000000000000000000" pitchFamily="2" charset="2"/>
+              </a:rPr>
+              <a:t>Incremento postfisso</a:t>
+            </a:r>
+            <a:endParaRPr lang="it-IT" sz="1600" dirty="0"/>
           </a:p>
         </p:txBody>
       </p:sp>
       <p:pic>
         <p:nvPicPr>
-          <p:cNvPr id="3" name="Picture 4" descr="Orario bianco - OROLOGI di Rexite | Arredinitaly">
-            <a:extLst>
-              <a:ext uri="{FF2B5EF4-FFF2-40B4-BE49-F238E27FC236}">
-                <a16:creationId xmlns:a16="http://schemas.microsoft.com/office/drawing/2014/main" id="{04AE8E3B-D957-E061-1728-5FE6414DEE43}"/>
+          <p:cNvPr id="5" name="Immagine 4">
+            <a:extLst>
+              <a:ext uri="{FF2B5EF4-FFF2-40B4-BE49-F238E27FC236}">
+                <a16:creationId xmlns:a16="http://schemas.microsoft.com/office/drawing/2014/main" id="{94321918-A2BB-26A5-A7AA-5C16727A9E4B}"/>
               </a:ext>
             </a:extLst>
           </p:cNvPr>
           <p:cNvPicPr>
-            <a:picLocks noChangeAspect="1" noChangeArrowheads="1"/>
+            <a:picLocks noChangeAspect="1"/>
           </p:cNvPicPr>
           <p:nvPr/>
         </p:nvPicPr>
         <p:blipFill>
-          <a:blip r:embed="rId2">
-            <a:extLst>
-              <a:ext uri="{28A0092B-C50C-407E-A947-70E740481C1C}">
-                <a14:useLocalDpi xmlns:a14="http://schemas.microsoft.com/office/drawing/2010/main" val="0"/>
-              </a:ext>
-            </a:extLst>
-          </a:blip>
-          <a:srcRect/>
+          <a:blip r:embed="rId2"/>
           <a:stretch>
             <a:fillRect/>
           </a:stretch>
         </p:blipFill>
-        <p:spPr bwMode="auto">
-          <a:xfrm>
-            <a:off x="832591" y="1580135"/>
-            <a:ext cx="3333750" cy="3333750"/>
-          </a:xfrm>
-          <a:prstGeom prst="rect">
-            <a:avLst/>
-          </a:prstGeom>
-          <a:noFill/>
-          <a:extLst>
-            <a:ext uri="{909E8E84-426E-40DD-AFC4-6F175D3DCCD1}">
-              <a14:hiddenFill xmlns:a14="http://schemas.microsoft.com/office/drawing/2010/main">
-                <a:solidFill>
-                  <a:srgbClr val="FFFFFF"/>
-                </a:solidFill>
-              </a14:hiddenFill>
-            </a:ext>
-          </a:extLst>
-        </p:spPr>
-      </p:pic>
-      <p:sp>
-        <p:nvSpPr>
-          <p:cNvPr id="5" name="CasellaDiTesto 4">
-            <a:extLst>
-              <a:ext uri="{FF2B5EF4-FFF2-40B4-BE49-F238E27FC236}">
-                <a16:creationId xmlns:a16="http://schemas.microsoft.com/office/drawing/2014/main" id="{058BACD3-0645-5D05-B75D-A86D0E2EB011}"/>
-              </a:ext>
-            </a:extLst>
-          </p:cNvPr>
-          <p:cNvSpPr txBox="1"/>
-          <p:nvPr/>
-        </p:nvSpPr>
-        <p:spPr>
-          <a:xfrm>
-            <a:off x="1559498" y="5365052"/>
-            <a:ext cx="7424928" cy="369332"/>
-          </a:xfrm>
-          <a:prstGeom prst="rect">
-            <a:avLst/>
-          </a:prstGeom>
-          <a:noFill/>
-        </p:spPr>
-        <p:txBody>
-          <a:bodyPr wrap="square" rtlCol="0">
-            <a:spAutoFit/>
-          </a:bodyPr>
-          <a:lstStyle/>
-          <a:p>
-            <a:r>
-              <a:rPr lang="it-IT" dirty="0"/>
-              <a:t>Estendiamo la nostra classe «orario» e vediamo alcuni esempi…</a:t>
-            </a:r>
-          </a:p>
-        </p:txBody>
-      </p:sp>
-      <p:pic>
-        <p:nvPicPr>
-          <p:cNvPr id="6" name="Picture 2">
-            <a:extLst>
-              <a:ext uri="{FF2B5EF4-FFF2-40B4-BE49-F238E27FC236}">
-                <a16:creationId xmlns:a16="http://schemas.microsoft.com/office/drawing/2014/main" id="{5F47177A-DE4A-34A6-EFFD-03A0620070D8}"/>
-              </a:ext>
-            </a:extLst>
-          </p:cNvPr>
-          <p:cNvPicPr>
-            <a:picLocks noChangeAspect="1" noChangeArrowheads="1"/>
-          </p:cNvPicPr>
-          <p:nvPr/>
-        </p:nvPicPr>
-        <p:blipFill>
-          <a:blip r:embed="rId3">
-            <a:extLst>
-              <a:ext uri="{28A0092B-C50C-407E-A947-70E740481C1C}">
-                <a14:useLocalDpi xmlns:a14="http://schemas.microsoft.com/office/drawing/2010/main" val="0"/>
-              </a:ext>
-            </a:extLst>
-          </a:blip>
-          <a:srcRect/>
-          <a:stretch>
-            <a:fillRect/>
-          </a:stretch>
-        </p:blipFill>
-        <p:spPr bwMode="auto">
-          <a:xfrm>
-            <a:off x="4977661" y="1580135"/>
-            <a:ext cx="3092335" cy="3092335"/>
-          </a:xfrm>
-          <a:prstGeom prst="rect">
-            <a:avLst/>
-          </a:prstGeom>
-          <a:noFill/>
-          <a:extLst>
-            <a:ext uri="{909E8E84-426E-40DD-AFC4-6F175D3DCCD1}">
-              <a14:hiddenFill xmlns:a14="http://schemas.microsoft.com/office/drawing/2010/main">
-                <a:solidFill>
-                  <a:srgbClr val="FFFFFF"/>
-                </a:solidFill>
-              </a14:hiddenFill>
-            </a:ext>
-          </a:extLst>
+        <p:spPr>
+          <a:xfrm>
+            <a:off x="1472266" y="2228574"/>
+            <a:ext cx="6056433" cy="1109849"/>
+          </a:xfrm>
+          <a:prstGeom prst="rect">
+            <a:avLst/>
+          </a:prstGeom>
         </p:spPr>
       </p:pic>
     </p:spTree>
     <p:extLst>
       <p:ext uri="{BB962C8B-B14F-4D97-AF65-F5344CB8AC3E}">
-        <p14:creationId xmlns:p14="http://schemas.microsoft.com/office/powerpoint/2010/main" val="3487479897"/>
+        <p14:creationId xmlns:p14="http://schemas.microsoft.com/office/powerpoint/2010/main" val="3452887810"/>
       </p:ext>
     </p:extLst>
   </p:cSld>
@@ -6831,7 +6799,7 @@
           <p:cNvPr id="2" name="Titolo 1">
             <a:extLst>
               <a:ext uri="{FF2B5EF4-FFF2-40B4-BE49-F238E27FC236}">
-                <a16:creationId xmlns:a16="http://schemas.microsoft.com/office/drawing/2014/main" id="{E6829A7B-6540-852A-128E-AB81590C2F7C}"/>
+                <a16:creationId xmlns:a16="http://schemas.microsoft.com/office/drawing/2014/main" id="{A1C33B46-A1F8-111B-8108-D696C1BBCC68}"/>
               </a:ext>
             </a:extLst>
           </p:cNvPr>
@@ -6849,7 +6817,7 @@
           <a:p>
             <a:r>
               <a:rPr lang="it-IT" dirty="0"/>
-              <a:t>Esercizio 4: Cosa stampa (4)</a:t>
+              <a:t>Overloading degli operatori</a:t>
             </a:r>
           </a:p>
         </p:txBody>
@@ -6859,7 +6827,7 @@
           <p:cNvPr id="4" name="Segnaposto numero diapositiva 3">
             <a:extLst>
               <a:ext uri="{FF2B5EF4-FFF2-40B4-BE49-F238E27FC236}">
-                <a16:creationId xmlns:a16="http://schemas.microsoft.com/office/drawing/2014/main" id="{C1A726B9-09D1-40A0-9688-9AA9FFB433D8}"/>
+                <a16:creationId xmlns:a16="http://schemas.microsoft.com/office/drawing/2014/main" id="{30F37182-85E1-1CBA-A05A-CCEC4E40C29C}"/>
               </a:ext>
             </a:extLst>
           </p:cNvPr>
@@ -6889,68 +6857,137 @@
       </p:sp>
       <p:pic>
         <p:nvPicPr>
-          <p:cNvPr id="6" name="Immagine 5">
-            <a:extLst>
-              <a:ext uri="{FF2B5EF4-FFF2-40B4-BE49-F238E27FC236}">
-                <a16:creationId xmlns:a16="http://schemas.microsoft.com/office/drawing/2014/main" id="{5E0EDCE1-6D2D-D3A3-4255-2AAC4A278E9C}"/>
+          <p:cNvPr id="3" name="Picture 4" descr="Orario bianco - OROLOGI di Rexite | Arredinitaly">
+            <a:extLst>
+              <a:ext uri="{FF2B5EF4-FFF2-40B4-BE49-F238E27FC236}">
+                <a16:creationId xmlns:a16="http://schemas.microsoft.com/office/drawing/2014/main" id="{04AE8E3B-D957-E061-1728-5FE6414DEE43}"/>
               </a:ext>
             </a:extLst>
           </p:cNvPr>
           <p:cNvPicPr>
-            <a:picLocks noChangeAspect="1"/>
+            <a:picLocks noChangeAspect="1" noChangeArrowheads="1"/>
           </p:cNvPicPr>
           <p:nvPr/>
         </p:nvPicPr>
         <p:blipFill>
-          <a:blip r:embed="rId2"/>
+          <a:blip r:embed="rId2">
+            <a:extLst>
+              <a:ext uri="{28A0092B-C50C-407E-A947-70E740481C1C}">
+                <a14:useLocalDpi xmlns:a14="http://schemas.microsoft.com/office/drawing/2010/main" val="0"/>
+              </a:ext>
+            </a:extLst>
+          </a:blip>
+          <a:srcRect/>
           <a:stretch>
             <a:fillRect/>
           </a:stretch>
         </p:blipFill>
-        <p:spPr>
-          <a:xfrm>
-            <a:off x="473807" y="1561933"/>
-            <a:ext cx="3829969" cy="4088532"/>
-          </a:xfrm>
-          <a:prstGeom prst="rect">
-            <a:avLst/>
-          </a:prstGeom>
+        <p:spPr bwMode="auto">
+          <a:xfrm>
+            <a:off x="832591" y="1580135"/>
+            <a:ext cx="3333750" cy="3333750"/>
+          </a:xfrm>
+          <a:prstGeom prst="rect">
+            <a:avLst/>
+          </a:prstGeom>
+          <a:noFill/>
+          <a:extLst>
+            <a:ext uri="{909E8E84-426E-40DD-AFC4-6F175D3DCCD1}">
+              <a14:hiddenFill xmlns:a14="http://schemas.microsoft.com/office/drawing/2010/main">
+                <a:solidFill>
+                  <a:srgbClr val="FFFFFF"/>
+                </a:solidFill>
+              </a14:hiddenFill>
+            </a:ext>
+          </a:extLst>
         </p:spPr>
       </p:pic>
+      <p:sp>
+        <p:nvSpPr>
+          <p:cNvPr id="5" name="CasellaDiTesto 4">
+            <a:extLst>
+              <a:ext uri="{FF2B5EF4-FFF2-40B4-BE49-F238E27FC236}">
+                <a16:creationId xmlns:a16="http://schemas.microsoft.com/office/drawing/2014/main" id="{058BACD3-0645-5D05-B75D-A86D0E2EB011}"/>
+              </a:ext>
+            </a:extLst>
+          </p:cNvPr>
+          <p:cNvSpPr txBox="1"/>
+          <p:nvPr/>
+        </p:nvSpPr>
+        <p:spPr>
+          <a:xfrm>
+            <a:off x="1559498" y="5365052"/>
+            <a:ext cx="7424928" cy="369332"/>
+          </a:xfrm>
+          <a:prstGeom prst="rect">
+            <a:avLst/>
+          </a:prstGeom>
+          <a:noFill/>
+        </p:spPr>
+        <p:txBody>
+          <a:bodyPr wrap="square" rtlCol="0">
+            <a:spAutoFit/>
+          </a:bodyPr>
+          <a:lstStyle/>
+          <a:p>
+            <a:r>
+              <a:rPr lang="it-IT" dirty="0"/>
+              <a:t>Estendiamo la nostra classe «orario» e vediamo alcuni esempi…</a:t>
+            </a:r>
+          </a:p>
+        </p:txBody>
+      </p:sp>
       <p:pic>
         <p:nvPicPr>
-          <p:cNvPr id="8" name="Immagine 7">
-            <a:extLst>
-              <a:ext uri="{FF2B5EF4-FFF2-40B4-BE49-F238E27FC236}">
-                <a16:creationId xmlns:a16="http://schemas.microsoft.com/office/drawing/2014/main" id="{3D3C7E72-5AC8-328C-9DD7-69700DD22F04}"/>
+          <p:cNvPr id="6" name="Picture 2">
+            <a:extLst>
+              <a:ext uri="{FF2B5EF4-FFF2-40B4-BE49-F238E27FC236}">
+                <a16:creationId xmlns:a16="http://schemas.microsoft.com/office/drawing/2014/main" id="{5F47177A-DE4A-34A6-EFFD-03A0620070D8}"/>
               </a:ext>
             </a:extLst>
           </p:cNvPr>
           <p:cNvPicPr>
-            <a:picLocks noChangeAspect="1"/>
+            <a:picLocks noChangeAspect="1" noChangeArrowheads="1"/>
           </p:cNvPicPr>
           <p:nvPr/>
         </p:nvPicPr>
         <p:blipFill>
-          <a:blip r:embed="rId3"/>
+          <a:blip r:embed="rId3">
+            <a:extLst>
+              <a:ext uri="{28A0092B-C50C-407E-A947-70E740481C1C}">
+                <a14:useLocalDpi xmlns:a14="http://schemas.microsoft.com/office/drawing/2010/main" val="0"/>
+              </a:ext>
+            </a:extLst>
+          </a:blip>
+          <a:srcRect/>
           <a:stretch>
             <a:fillRect/>
           </a:stretch>
         </p:blipFill>
-        <p:spPr>
-          <a:xfrm>
-            <a:off x="4940284" y="1905526"/>
-            <a:ext cx="3515709" cy="3046948"/>
-          </a:xfrm>
-          <a:prstGeom prst="rect">
-            <a:avLst/>
-          </a:prstGeom>
+        <p:spPr bwMode="auto">
+          <a:xfrm>
+            <a:off x="4977661" y="1580135"/>
+            <a:ext cx="3092335" cy="3092335"/>
+          </a:xfrm>
+          <a:prstGeom prst="rect">
+            <a:avLst/>
+          </a:prstGeom>
+          <a:noFill/>
+          <a:extLst>
+            <a:ext uri="{909E8E84-426E-40DD-AFC4-6F175D3DCCD1}">
+              <a14:hiddenFill xmlns:a14="http://schemas.microsoft.com/office/drawing/2010/main">
+                <a:solidFill>
+                  <a:srgbClr val="FFFFFF"/>
+                </a:solidFill>
+              </a14:hiddenFill>
+            </a:ext>
+          </a:extLst>
         </p:spPr>
       </p:pic>
     </p:spTree>
     <p:extLst>
       <p:ext uri="{BB962C8B-B14F-4D97-AF65-F5344CB8AC3E}">
-        <p14:creationId xmlns:p14="http://schemas.microsoft.com/office/powerpoint/2010/main" val="4169302503"/>
+        <p14:creationId xmlns:p14="http://schemas.microsoft.com/office/powerpoint/2010/main" val="3487479897"/>
       </p:ext>
     </p:extLst>
   </p:cSld>
@@ -7000,7 +7037,7 @@
           <a:p>
             <a:r>
               <a:rPr lang="it-IT" dirty="0"/>
-              <a:t>Esercizio 4: Soluzione</a:t>
+              <a:t>Esercizio 4: Cosa stampa (4)</a:t>
             </a:r>
           </a:p>
         </p:txBody>
@@ -7040,10 +7077,10 @@
       </p:sp>
       <p:pic>
         <p:nvPicPr>
-          <p:cNvPr id="5" name="Immagine 4">
-            <a:extLst>
-              <a:ext uri="{FF2B5EF4-FFF2-40B4-BE49-F238E27FC236}">
-                <a16:creationId xmlns:a16="http://schemas.microsoft.com/office/drawing/2014/main" id="{0BB57CED-A33C-7CBD-CDA7-BDB721096742}"/>
+          <p:cNvPr id="6" name="Immagine 5">
+            <a:extLst>
+              <a:ext uri="{FF2B5EF4-FFF2-40B4-BE49-F238E27FC236}">
+                <a16:creationId xmlns:a16="http://schemas.microsoft.com/office/drawing/2014/main" id="{5E0EDCE1-6D2D-D3A3-4255-2AAC4A278E9C}"/>
               </a:ext>
             </a:extLst>
           </p:cNvPr>
@@ -7060,8 +7097,8 @@
         </p:blipFill>
         <p:spPr>
           <a:xfrm>
-            <a:off x="5093976" y="2160119"/>
-            <a:ext cx="3498952" cy="2497863"/>
+            <a:off x="473807" y="1561933"/>
+            <a:ext cx="3829969" cy="4088532"/>
           </a:xfrm>
           <a:prstGeom prst="rect">
             <a:avLst/>
@@ -7070,10 +7107,10 @@
       </p:pic>
       <p:pic>
         <p:nvPicPr>
-          <p:cNvPr id="3" name="Immagine 2">
-            <a:extLst>
-              <a:ext uri="{FF2B5EF4-FFF2-40B4-BE49-F238E27FC236}">
-                <a16:creationId xmlns:a16="http://schemas.microsoft.com/office/drawing/2014/main" id="{3CBCD9A8-0939-A077-FFAF-1D7E0E4889FA}"/>
+          <p:cNvPr id="8" name="Immagine 7">
+            <a:extLst>
+              <a:ext uri="{FF2B5EF4-FFF2-40B4-BE49-F238E27FC236}">
+                <a16:creationId xmlns:a16="http://schemas.microsoft.com/office/drawing/2014/main" id="{3D3C7E72-5AC8-328C-9DD7-69700DD22F04}"/>
               </a:ext>
             </a:extLst>
           </p:cNvPr>
@@ -7090,7 +7127,7 @@
         </p:blipFill>
         <p:spPr>
           <a:xfrm>
-            <a:off x="721967" y="1905525"/>
+            <a:off x="4940284" y="1905526"/>
             <a:ext cx="3515709" cy="3046948"/>
           </a:xfrm>
           <a:prstGeom prst="rect">
@@ -7101,7 +7138,7 @@
     </p:spTree>
     <p:extLst>
       <p:ext uri="{BB962C8B-B14F-4D97-AF65-F5344CB8AC3E}">
-        <p14:creationId xmlns:p14="http://schemas.microsoft.com/office/powerpoint/2010/main" val="3965213729"/>
+        <p14:creationId xmlns:p14="http://schemas.microsoft.com/office/powerpoint/2010/main" val="4169302503"/>
       </p:ext>
     </p:extLst>
   </p:cSld>
@@ -7133,7 +7170,7 @@
           <p:cNvPr id="2" name="Titolo 1">
             <a:extLst>
               <a:ext uri="{FF2B5EF4-FFF2-40B4-BE49-F238E27FC236}">
-                <a16:creationId xmlns:a16="http://schemas.microsoft.com/office/drawing/2014/main" id="{5CF5972C-0648-4853-0835-24A93B1910D8}"/>
+                <a16:creationId xmlns:a16="http://schemas.microsoft.com/office/drawing/2014/main" id="{E6829A7B-6540-852A-128E-AB81590C2F7C}"/>
               </a:ext>
             </a:extLst>
           </p:cNvPr>
@@ -7151,7 +7188,7 @@
           <a:p>
             <a:r>
               <a:rPr lang="it-IT" dirty="0"/>
-              <a:t>Esercizio 5: Modellazione</a:t>
+              <a:t>Esercizio 4: Soluzione</a:t>
             </a:r>
           </a:p>
         </p:txBody>
@@ -7161,7 +7198,7 @@
           <p:cNvPr id="4" name="Segnaposto numero diapositiva 3">
             <a:extLst>
               <a:ext uri="{FF2B5EF4-FFF2-40B4-BE49-F238E27FC236}">
-                <a16:creationId xmlns:a16="http://schemas.microsoft.com/office/drawing/2014/main" id="{D7633F4F-FEB4-A12D-AED3-C2BED95952C1}"/>
+                <a16:creationId xmlns:a16="http://schemas.microsoft.com/office/drawing/2014/main" id="{C1A726B9-09D1-40A0-9688-9AA9FFB433D8}"/>
               </a:ext>
             </a:extLst>
           </p:cNvPr>
@@ -7191,10 +7228,10 @@
       </p:sp>
       <p:pic>
         <p:nvPicPr>
-          <p:cNvPr id="6" name="Immagine 5">
-            <a:extLst>
-              <a:ext uri="{FF2B5EF4-FFF2-40B4-BE49-F238E27FC236}">
-                <a16:creationId xmlns:a16="http://schemas.microsoft.com/office/drawing/2014/main" id="{4ECB75AF-5757-61C8-A2B0-29EA02BC34C7}"/>
+          <p:cNvPr id="5" name="Immagine 4">
+            <a:extLst>
+              <a:ext uri="{FF2B5EF4-FFF2-40B4-BE49-F238E27FC236}">
+                <a16:creationId xmlns:a16="http://schemas.microsoft.com/office/drawing/2014/main" id="{0BB57CED-A33C-7CBD-CDA7-BDB721096742}"/>
               </a:ext>
             </a:extLst>
           </p:cNvPr>
@@ -7211,8 +7248,38 @@
         </p:blipFill>
         <p:spPr>
           <a:xfrm>
-            <a:off x="1296413" y="2252287"/>
-            <a:ext cx="6551173" cy="2395143"/>
+            <a:off x="5093976" y="2160119"/>
+            <a:ext cx="3498952" cy="2497863"/>
+          </a:xfrm>
+          <a:prstGeom prst="rect">
+            <a:avLst/>
+          </a:prstGeom>
+        </p:spPr>
+      </p:pic>
+      <p:pic>
+        <p:nvPicPr>
+          <p:cNvPr id="3" name="Immagine 2">
+            <a:extLst>
+              <a:ext uri="{FF2B5EF4-FFF2-40B4-BE49-F238E27FC236}">
+                <a16:creationId xmlns:a16="http://schemas.microsoft.com/office/drawing/2014/main" id="{3CBCD9A8-0939-A077-FFAF-1D7E0E4889FA}"/>
+              </a:ext>
+            </a:extLst>
+          </p:cNvPr>
+          <p:cNvPicPr>
+            <a:picLocks noChangeAspect="1"/>
+          </p:cNvPicPr>
+          <p:nvPr/>
+        </p:nvPicPr>
+        <p:blipFill>
+          <a:blip r:embed="rId3"/>
+          <a:stretch>
+            <a:fillRect/>
+          </a:stretch>
+        </p:blipFill>
+        <p:spPr>
+          <a:xfrm>
+            <a:off x="721967" y="1905525"/>
+            <a:ext cx="3515709" cy="3046948"/>
           </a:xfrm>
           <a:prstGeom prst="rect">
             <a:avLst/>
@@ -7222,7 +7289,7 @@
     </p:spTree>
     <p:extLst>
       <p:ext uri="{BB962C8B-B14F-4D97-AF65-F5344CB8AC3E}">
-        <p14:creationId xmlns:p14="http://schemas.microsoft.com/office/powerpoint/2010/main" val="397861251"/>
+        <p14:creationId xmlns:p14="http://schemas.microsoft.com/office/powerpoint/2010/main" val="3965213729"/>
       </p:ext>
     </p:extLst>
   </p:cSld>
@@ -7308,7 +7375,7 @@
         </p:blipFill>
         <p:spPr bwMode="auto">
           <a:xfrm>
-            <a:off x="2286000" y="1658879"/>
+            <a:off x="2286000" y="2041434"/>
             <a:ext cx="4572000" cy="2571750"/>
           </a:xfrm>
           <a:prstGeom prst="rect">
@@ -7326,66 +7393,6 @@
           </a:extLst>
         </p:spPr>
       </p:pic>
-      <p:sp>
-        <p:nvSpPr>
-          <p:cNvPr id="3" name="CasellaDiTesto 2">
-            <a:extLst>
-              <a:ext uri="{FF2B5EF4-FFF2-40B4-BE49-F238E27FC236}">
-                <a16:creationId xmlns:a16="http://schemas.microsoft.com/office/drawing/2014/main" id="{0F4AC5FE-39CC-083D-9D86-6A7104CA40F4}"/>
-              </a:ext>
-            </a:extLst>
-          </p:cNvPr>
-          <p:cNvSpPr txBox="1"/>
-          <p:nvPr/>
-        </p:nvSpPr>
-        <p:spPr>
-          <a:xfrm>
-            <a:off x="238557" y="4671566"/>
-            <a:ext cx="8430990" cy="1200329"/>
-          </a:xfrm>
-          <a:prstGeom prst="rect">
-            <a:avLst/>
-          </a:prstGeom>
-          <a:noFill/>
-        </p:spPr>
-        <p:txBody>
-          <a:bodyPr wrap="square" rtlCol="0">
-            <a:spAutoFit/>
-          </a:bodyPr>
-          <a:lstStyle/>
-          <a:p>
-            <a:pPr lvl="1" algn="ctr"/>
-            <a:r>
-              <a:rPr lang="it-IT" dirty="0"/>
-              <a:t>Repository di riferimento:</a:t>
-            </a:r>
-          </a:p>
-          <a:p>
-            <a:pPr lvl="1" algn="ctr"/>
-            <a:r>
-              <a:rPr lang="it-IT" u="sng" dirty="0">
-                <a:hlinkClick r:id="rId3"/>
-              </a:rPr>
-              <a:t>https://github.com/gabrielrovesti/Tutorato-Programmazione-ad-Oggetti-2023-2024</a:t>
-            </a:r>
-            <a:r>
-              <a:rPr lang="it-IT" u="sng" dirty="0"/>
-              <a:t> </a:t>
-            </a:r>
-          </a:p>
-          <a:p>
-            <a:pPr lvl="1"/>
-            <a:endParaRPr lang="it-IT" dirty="0"/>
-          </a:p>
-          <a:p>
-            <a:pPr marL="285750" indent="-285750">
-              <a:buFont typeface="Arial" panose="020B0604020202020204" pitchFamily="34" charset="0"/>
-              <a:buChar char="•"/>
-            </a:pPr>
-            <a:endParaRPr lang="it-IT" dirty="0"/>
-          </a:p>
-        </p:txBody>
-      </p:sp>
     </p:spTree>
     <p:extLst>
       <p:ext uri="{BB962C8B-B14F-4D97-AF65-F5344CB8AC3E}">

</xml_diff>